<commit_message>
edited slides M06.1 M06.2 and M06.3
</commit_message>
<xml_diff>
--- a/Slides/Module 06.2 Agile Planning and Estimation.pptx
+++ b/Slides/Module 06.2 Agile Planning and Estimation.pptx
@@ -10,20 +10,20 @@
   <p:sldIdLst>
     <p:sldId id="485" r:id="rId2"/>
     <p:sldId id="396" r:id="rId3"/>
-    <p:sldId id="497" r:id="rId4"/>
-    <p:sldId id="533" r:id="rId5"/>
-    <p:sldId id="519" r:id="rId6"/>
-    <p:sldId id="520" r:id="rId7"/>
-    <p:sldId id="535" r:id="rId8"/>
-    <p:sldId id="544" r:id="rId9"/>
-    <p:sldId id="536" r:id="rId10"/>
-    <p:sldId id="537" r:id="rId11"/>
-    <p:sldId id="540" r:id="rId12"/>
-    <p:sldId id="542" r:id="rId13"/>
-    <p:sldId id="538" r:id="rId14"/>
-    <p:sldId id="541" r:id="rId15"/>
-    <p:sldId id="546" r:id="rId16"/>
-    <p:sldId id="545" r:id="rId17"/>
+    <p:sldId id="533" r:id="rId4"/>
+    <p:sldId id="519" r:id="rId5"/>
+    <p:sldId id="520" r:id="rId6"/>
+    <p:sldId id="535" r:id="rId7"/>
+    <p:sldId id="544" r:id="rId8"/>
+    <p:sldId id="536" r:id="rId9"/>
+    <p:sldId id="537" r:id="rId10"/>
+    <p:sldId id="547" r:id="rId11"/>
+    <p:sldId id="542" r:id="rId12"/>
+    <p:sldId id="538" r:id="rId13"/>
+    <p:sldId id="541" r:id="rId14"/>
+    <p:sldId id="546" r:id="rId15"/>
+    <p:sldId id="545" r:id="rId16"/>
+    <p:sldId id="548" r:id="rId17"/>
     <p:sldId id="543" r:id="rId18"/>
     <p:sldId id="518" r:id="rId19"/>
   </p:sldIdLst>
@@ -156,7 +156,6 @@
           <p14:sldIdLst>
             <p14:sldId id="485"/>
             <p14:sldId id="396"/>
-            <p14:sldId id="497"/>
             <p14:sldId id="533"/>
             <p14:sldId id="519"/>
             <p14:sldId id="520"/>
@@ -164,12 +163,13 @@
             <p14:sldId id="544"/>
             <p14:sldId id="536"/>
             <p14:sldId id="537"/>
-            <p14:sldId id="540"/>
+            <p14:sldId id="547"/>
             <p14:sldId id="542"/>
             <p14:sldId id="538"/>
             <p14:sldId id="541"/>
             <p14:sldId id="546"/>
             <p14:sldId id="545"/>
+            <p14:sldId id="548"/>
             <p14:sldId id="543"/>
             <p14:sldId id="518"/>
           </p14:sldIdLst>
@@ -181,6 +181,231 @@
     </p:ext>
   </p:extLst>
 </p:presentation>
+</file>
+
+<file path=ppt/revisionInfo.xml><?xml version="1.0" encoding="utf-8"?>
+<p1510:revInfo xmlns:a="http://schemas.openxmlformats.org/drawingml/2006/main" xmlns:r="http://schemas.openxmlformats.org/officeDocument/2006/relationships" xmlns:p1510="http://schemas.microsoft.com/office/powerpoint/2015/10/main">
+  <p1510:revLst>
+    <p1510:client id="{3B42089B-8415-4363-BCE0-B2AF3FBB1D94}" v="5" dt="2023-01-20T01:09:31.859"/>
+  </p1510:revLst>
+</p1510:revInfo>
+</file>
+
+<file path=ppt/changesInfos/changesInfo1.xml><?xml version="1.0" encoding="utf-8"?>
+<pc:chgInfo xmlns:a="http://schemas.openxmlformats.org/drawingml/2006/main" xmlns:r="http://schemas.openxmlformats.org/officeDocument/2006/relationships" xmlns:ac="http://schemas.microsoft.com/office/drawing/2013/main/command" xmlns:pc="http://schemas.microsoft.com/office/powerpoint/2013/main/command">
+  <pc:docChgLst>
+    <pc:chgData name="Mitchell Wand" userId="de9b44c55c049659" providerId="LiveId" clId="{3B42089B-8415-4363-BCE0-B2AF3FBB1D94}"/>
+    <pc:docChg chg="undo custSel addSld delSld modSld sldOrd modSection">
+      <pc:chgData name="Mitchell Wand" userId="de9b44c55c049659" providerId="LiveId" clId="{3B42089B-8415-4363-BCE0-B2AF3FBB1D94}" dt="2023-01-20T01:17:30.665" v="4489" actId="20577"/>
+      <pc:docMkLst>
+        <pc:docMk/>
+      </pc:docMkLst>
+      <pc:sldChg chg="del">
+        <pc:chgData name="Mitchell Wand" userId="de9b44c55c049659" providerId="LiveId" clId="{3B42089B-8415-4363-BCE0-B2AF3FBB1D94}" dt="2023-01-20T00:27:33.630" v="0" actId="2696"/>
+        <pc:sldMkLst>
+          <pc:docMk/>
+          <pc:sldMk cId="537342029" sldId="497"/>
+        </pc:sldMkLst>
+      </pc:sldChg>
+      <pc:sldChg chg="modSp mod modNotesTx">
+        <pc:chgData name="Mitchell Wand" userId="de9b44c55c049659" providerId="LiveId" clId="{3B42089B-8415-4363-BCE0-B2AF3FBB1D94}" dt="2023-01-20T00:36:01.534" v="289" actId="20577"/>
+        <pc:sldMkLst>
+          <pc:docMk/>
+          <pc:sldMk cId="2648221251" sldId="520"/>
+        </pc:sldMkLst>
+        <pc:spChg chg="mod">
+          <ac:chgData name="Mitchell Wand" userId="de9b44c55c049659" providerId="LiveId" clId="{3B42089B-8415-4363-BCE0-B2AF3FBB1D94}" dt="2023-01-20T00:33:46.374" v="146"/>
+          <ac:spMkLst>
+            <pc:docMk/>
+            <pc:sldMk cId="2648221251" sldId="520"/>
+            <ac:spMk id="10" creationId="{6C90178D-675E-8D46-BAC9-67938256DF87}"/>
+          </ac:spMkLst>
+        </pc:spChg>
+      </pc:sldChg>
+      <pc:sldChg chg="modSp mod">
+        <pc:chgData name="Mitchell Wand" userId="de9b44c55c049659" providerId="LiveId" clId="{3B42089B-8415-4363-BCE0-B2AF3FBB1D94}" dt="2023-01-20T00:36:46.954" v="303" actId="207"/>
+        <pc:sldMkLst>
+          <pc:docMk/>
+          <pc:sldMk cId="1759301765" sldId="535"/>
+        </pc:sldMkLst>
+        <pc:spChg chg="mod">
+          <ac:chgData name="Mitchell Wand" userId="de9b44c55c049659" providerId="LiveId" clId="{3B42089B-8415-4363-BCE0-B2AF3FBB1D94}" dt="2023-01-20T00:36:25.674" v="301" actId="20577"/>
+          <ac:spMkLst>
+            <pc:docMk/>
+            <pc:sldMk cId="1759301765" sldId="535"/>
+            <ac:spMk id="2" creationId="{CEC5C053-AC82-1A4A-8C97-88CF2D745EF5}"/>
+          </ac:spMkLst>
+        </pc:spChg>
+        <pc:graphicFrameChg chg="modGraphic">
+          <ac:chgData name="Mitchell Wand" userId="de9b44c55c049659" providerId="LiveId" clId="{3B42089B-8415-4363-BCE0-B2AF3FBB1D94}" dt="2023-01-20T00:36:46.954" v="303" actId="207"/>
+          <ac:graphicFrameMkLst>
+            <pc:docMk/>
+            <pc:sldMk cId="1759301765" sldId="535"/>
+            <ac:graphicFrameMk id="6" creationId="{A3F41C8F-79F6-A54A-9628-8EF0F2E1D797}"/>
+          </ac:graphicFrameMkLst>
+        </pc:graphicFrameChg>
+      </pc:sldChg>
+      <pc:sldChg chg="modSp mod">
+        <pc:chgData name="Mitchell Wand" userId="de9b44c55c049659" providerId="LiveId" clId="{3B42089B-8415-4363-BCE0-B2AF3FBB1D94}" dt="2023-01-20T00:47:26.210" v="1320" actId="20577"/>
+        <pc:sldMkLst>
+          <pc:docMk/>
+          <pc:sldMk cId="2524749999" sldId="537"/>
+        </pc:sldMkLst>
+        <pc:spChg chg="mod">
+          <ac:chgData name="Mitchell Wand" userId="de9b44c55c049659" providerId="LiveId" clId="{3B42089B-8415-4363-BCE0-B2AF3FBB1D94}" dt="2023-01-20T00:46:59.948" v="1268" actId="20577"/>
+          <ac:spMkLst>
+            <pc:docMk/>
+            <pc:sldMk cId="2524749999" sldId="537"/>
+            <ac:spMk id="2" creationId="{BF181906-AFAD-2443-AA7E-27F23CC0B974}"/>
+          </ac:spMkLst>
+        </pc:spChg>
+        <pc:spChg chg="mod">
+          <ac:chgData name="Mitchell Wand" userId="de9b44c55c049659" providerId="LiveId" clId="{3B42089B-8415-4363-BCE0-B2AF3FBB1D94}" dt="2023-01-20T00:47:26.210" v="1320" actId="20577"/>
+          <ac:spMkLst>
+            <pc:docMk/>
+            <pc:sldMk cId="2524749999" sldId="537"/>
+            <ac:spMk id="3" creationId="{9678B439-61A3-F547-A942-3898EA583C22}"/>
+          </ac:spMkLst>
+        </pc:spChg>
+      </pc:sldChg>
+      <pc:sldChg chg="modNotesTx">
+        <pc:chgData name="Mitchell Wand" userId="de9b44c55c049659" providerId="LiveId" clId="{3B42089B-8415-4363-BCE0-B2AF3FBB1D94}" dt="2023-01-20T01:00:33.865" v="2589" actId="20577"/>
+        <pc:sldMkLst>
+          <pc:docMk/>
+          <pc:sldMk cId="1559642377" sldId="538"/>
+        </pc:sldMkLst>
+      </pc:sldChg>
+      <pc:sldChg chg="del modNotesTx">
+        <pc:chgData name="Mitchell Wand" userId="de9b44c55c049659" providerId="LiveId" clId="{3B42089B-8415-4363-BCE0-B2AF3FBB1D94}" dt="2023-01-20T00:57:48.996" v="2558" actId="2696"/>
+        <pc:sldMkLst>
+          <pc:docMk/>
+          <pc:sldMk cId="3558050744" sldId="540"/>
+        </pc:sldMkLst>
+      </pc:sldChg>
+      <pc:sldChg chg="modNotesTx">
+        <pc:chgData name="Mitchell Wand" userId="de9b44c55c049659" providerId="LiveId" clId="{3B42089B-8415-4363-BCE0-B2AF3FBB1D94}" dt="2023-01-20T01:01:55.993" v="2657" actId="20577"/>
+        <pc:sldMkLst>
+          <pc:docMk/>
+          <pc:sldMk cId="1324572734" sldId="541"/>
+        </pc:sldMkLst>
+      </pc:sldChg>
+      <pc:sldChg chg="modNotesTx">
+        <pc:chgData name="Mitchell Wand" userId="de9b44c55c049659" providerId="LiveId" clId="{3B42089B-8415-4363-BCE0-B2AF3FBB1D94}" dt="2023-01-20T01:17:30.665" v="4489" actId="20577"/>
+        <pc:sldMkLst>
+          <pc:docMk/>
+          <pc:sldMk cId="1662881311" sldId="543"/>
+        </pc:sldMkLst>
+      </pc:sldChg>
+      <pc:sldChg chg="modNotesTx">
+        <pc:chgData name="Mitchell Wand" userId="de9b44c55c049659" providerId="LiveId" clId="{3B42089B-8415-4363-BCE0-B2AF3FBB1D94}" dt="2023-01-20T00:45:29.937" v="1213" actId="6549"/>
+        <pc:sldMkLst>
+          <pc:docMk/>
+          <pc:sldMk cId="328446738" sldId="544"/>
+        </pc:sldMkLst>
+      </pc:sldChg>
+      <pc:sldChg chg="modSp mod modNotesTx">
+        <pc:chgData name="Mitchell Wand" userId="de9b44c55c049659" providerId="LiveId" clId="{3B42089B-8415-4363-BCE0-B2AF3FBB1D94}" dt="2023-01-20T01:08:59.606" v="3464" actId="20577"/>
+        <pc:sldMkLst>
+          <pc:docMk/>
+          <pc:sldMk cId="2042169481" sldId="545"/>
+        </pc:sldMkLst>
+        <pc:spChg chg="mod">
+          <ac:chgData name="Mitchell Wand" userId="de9b44c55c049659" providerId="LiveId" clId="{3B42089B-8415-4363-BCE0-B2AF3FBB1D94}" dt="2023-01-20T01:05:52.095" v="2963" actId="20577"/>
+          <ac:spMkLst>
+            <pc:docMk/>
+            <pc:sldMk cId="2042169481" sldId="545"/>
+            <ac:spMk id="2" creationId="{B757D396-2940-8C43-BAB6-4A04F25BB409}"/>
+          </ac:spMkLst>
+        </pc:spChg>
+      </pc:sldChg>
+      <pc:sldChg chg="modNotesTx">
+        <pc:chgData name="Mitchell Wand" userId="de9b44c55c049659" providerId="LiveId" clId="{3B42089B-8415-4363-BCE0-B2AF3FBB1D94}" dt="2023-01-20T01:05:15.777" v="2955" actId="20577"/>
+        <pc:sldMkLst>
+          <pc:docMk/>
+          <pc:sldMk cId="1851008461" sldId="546"/>
+        </pc:sldMkLst>
+      </pc:sldChg>
+      <pc:sldChg chg="delSp modSp add mod ord setBg delDesignElem modNotesTx">
+        <pc:chgData name="Mitchell Wand" userId="de9b44c55c049659" providerId="LiveId" clId="{3B42089B-8415-4363-BCE0-B2AF3FBB1D94}" dt="2023-01-20T00:59:02.927" v="2574" actId="20577"/>
+        <pc:sldMkLst>
+          <pc:docMk/>
+          <pc:sldMk cId="2646015315" sldId="547"/>
+        </pc:sldMkLst>
+        <pc:spChg chg="mod">
+          <ac:chgData name="Mitchell Wand" userId="de9b44c55c049659" providerId="LiveId" clId="{3B42089B-8415-4363-BCE0-B2AF3FBB1D94}" dt="2023-01-20T00:53:17.646" v="1939" actId="1076"/>
+          <ac:spMkLst>
+            <pc:docMk/>
+            <pc:sldMk cId="2646015315" sldId="547"/>
+            <ac:spMk id="2" creationId="{CF77E850-1659-7648-9048-5BB7A05803EA}"/>
+          </ac:spMkLst>
+        </pc:spChg>
+        <pc:spChg chg="del">
+          <ac:chgData name="Mitchell Wand" userId="de9b44c55c049659" providerId="LiveId" clId="{3B42089B-8415-4363-BCE0-B2AF3FBB1D94}" dt="2023-01-20T00:49:53.602" v="1497"/>
+          <ac:spMkLst>
+            <pc:docMk/>
+            <pc:sldMk cId="2646015315" sldId="547"/>
+            <ac:spMk id="75" creationId="{5DCB5928-DC7D-4612-9922-441966E15627}"/>
+          </ac:spMkLst>
+        </pc:spChg>
+        <pc:spChg chg="del">
+          <ac:chgData name="Mitchell Wand" userId="de9b44c55c049659" providerId="LiveId" clId="{3B42089B-8415-4363-BCE0-B2AF3FBB1D94}" dt="2023-01-20T00:49:53.602" v="1497"/>
+          <ac:spMkLst>
+            <pc:docMk/>
+            <pc:sldMk cId="2646015315" sldId="547"/>
+            <ac:spMk id="77" creationId="{682C1161-1736-45EC-99B7-33F3CAE9D517}"/>
+          </ac:spMkLst>
+        </pc:spChg>
+        <pc:spChg chg="del">
+          <ac:chgData name="Mitchell Wand" userId="de9b44c55c049659" providerId="LiveId" clId="{3B42089B-8415-4363-BCE0-B2AF3FBB1D94}" dt="2023-01-20T00:49:53.602" v="1497"/>
+          <ac:spMkLst>
+            <pc:docMk/>
+            <pc:sldMk cId="2646015315" sldId="547"/>
+            <ac:spMk id="79" creationId="{84D4DDB8-B68F-45B0-9F62-C4279996F672}"/>
+          </ac:spMkLst>
+        </pc:spChg>
+        <pc:spChg chg="del">
+          <ac:chgData name="Mitchell Wand" userId="de9b44c55c049659" providerId="LiveId" clId="{3B42089B-8415-4363-BCE0-B2AF3FBB1D94}" dt="2023-01-20T00:49:53.602" v="1497"/>
+          <ac:spMkLst>
+            <pc:docMk/>
+            <pc:sldMk cId="2646015315" sldId="547"/>
+            <ac:spMk id="81" creationId="{AF2F604E-43BE-4DC3-B983-E071523364F8}"/>
+          </ac:spMkLst>
+        </pc:spChg>
+        <pc:spChg chg="del">
+          <ac:chgData name="Mitchell Wand" userId="de9b44c55c049659" providerId="LiveId" clId="{3B42089B-8415-4363-BCE0-B2AF3FBB1D94}" dt="2023-01-20T00:49:53.602" v="1497"/>
+          <ac:spMkLst>
+            <pc:docMk/>
+            <pc:sldMk cId="2646015315" sldId="547"/>
+            <ac:spMk id="83" creationId="{08C9B587-E65E-4B52-B37C-ABEBB6E87928}"/>
+          </ac:spMkLst>
+        </pc:spChg>
+      </pc:sldChg>
+      <pc:sldChg chg="modSp new mod modNotesTx">
+        <pc:chgData name="Mitchell Wand" userId="de9b44c55c049659" providerId="LiveId" clId="{3B42089B-8415-4363-BCE0-B2AF3FBB1D94}" dt="2023-01-20T01:15:08.882" v="4368" actId="20577"/>
+        <pc:sldMkLst>
+          <pc:docMk/>
+          <pc:sldMk cId="3513066855" sldId="548"/>
+        </pc:sldMkLst>
+        <pc:spChg chg="mod">
+          <ac:chgData name="Mitchell Wand" userId="de9b44c55c049659" providerId="LiveId" clId="{3B42089B-8415-4363-BCE0-B2AF3FBB1D94}" dt="2023-01-20T01:09:21.487" v="3510" actId="20577"/>
+          <ac:spMkLst>
+            <pc:docMk/>
+            <pc:sldMk cId="3513066855" sldId="548"/>
+            <ac:spMk id="2" creationId="{1C0D1339-A191-4B11-1C20-9CA819E46D88}"/>
+          </ac:spMkLst>
+        </pc:spChg>
+        <pc:spChg chg="mod">
+          <ac:chgData name="Mitchell Wand" userId="de9b44c55c049659" providerId="LiveId" clId="{3B42089B-8415-4363-BCE0-B2AF3FBB1D94}" dt="2023-01-20T01:13:13.127" v="4036" actId="20577"/>
+          <ac:spMkLst>
+            <pc:docMk/>
+            <pc:sldMk cId="3513066855" sldId="548"/>
+            <ac:spMk id="3" creationId="{4BB8D8C3-BF80-531E-43C3-CD63CDB1D1C4}"/>
+          </ac:spMkLst>
+        </pc:spChg>
+      </pc:sldChg>
+    </pc:docChg>
+  </pc:docChgLst>
+</pc:chgInfo>
 </file>
 
 <file path=ppt/notesMasters/notesMaster1.xml><?xml version="1.0" encoding="utf-8"?>
@@ -265,7 +490,7 @@
           <a:p>
             <a:fld id="{7C7E5181-6CF5-45F7-A87A-E0E0B1FD7549}" type="datetimeFigureOut">
               <a:rPr lang="en-US" smtClean="0"/>
-              <a:t>1/14/2023</a:t>
+              <a:t>1/19/2023</a:t>
             </a:fld>
             <a:endParaRPr lang="en-US"/>
           </a:p>
@@ -660,27 +885,154 @@
           <a:bodyPr/>
           <a:lstStyle/>
           <a:p>
-            <a:r>
-              <a:rPr lang="en-US" dirty="0"/>
-              <a:t>Here’s an example of a sprint backlog that decomposes two of the </a:t>
-            </a:r>
-            <a:r>
-              <a:rPr lang="en-US" dirty="0" err="1"/>
-              <a:t>plowtracker</a:t>
-            </a:r>
-            <a:r>
-              <a:rPr lang="en-US" dirty="0"/>
-              <a:t> user stories into individual tasks. This list of tasks may not be fully exhaustive. Important to note that they are grouped in some logical manner that might help us organize who works on what, and that there are design, test, and implementation tasks in here.</a:t>
-            </a:r>
-          </a:p>
-          <a:p>
+            <a:pPr marL="0" marR="0" lvl="0" indent="0" algn="l" defTabSz="914400" rtl="0" eaLnBrk="1" fontAlgn="auto" latinLnBrk="0" hangingPunct="1">
+              <a:lnSpc>
+                <a:spcPct val="100000"/>
+              </a:lnSpc>
+              <a:spcBef>
+                <a:spcPts val="0"/>
+              </a:spcBef>
+              <a:spcAft>
+                <a:spcPts val="0"/>
+              </a:spcAft>
+              <a:buClrTx/>
+              <a:buSzTx/>
+              <a:buFontTx/>
+              <a:buNone/>
+              <a:tabLst/>
+              <a:defRPr/>
+            </a:pPr>
+            <a:r>
+              <a:rPr lang="en-US" dirty="0"/>
+              <a:t>We can’t tell whether our sprint plan (like the one on the last slide) is realistic until we have a good guess as to how much time each task will take.</a:t>
+            </a:r>
+          </a:p>
+          <a:p>
+            <a:pPr marL="0" marR="0" lvl="0" indent="0" algn="l" defTabSz="914400" rtl="0" eaLnBrk="1" fontAlgn="auto" latinLnBrk="0" hangingPunct="1">
+              <a:lnSpc>
+                <a:spcPct val="100000"/>
+              </a:lnSpc>
+              <a:spcBef>
+                <a:spcPts val="0"/>
+              </a:spcBef>
+              <a:spcAft>
+                <a:spcPts val="0"/>
+              </a:spcAft>
+              <a:buClrTx/>
+              <a:buSzTx/>
+              <a:buFontTx/>
+              <a:buNone/>
+              <a:tabLst/>
+              <a:defRPr/>
+            </a:pPr>
             <a:endParaRPr lang="en-US" dirty="0"/>
           </a:p>
           <a:p>
             <a:r>
               <a:rPr lang="en-US" dirty="0"/>
-              <a:t>Note: no estimation yet. We can’t estimate until we have the tasks. If you don’t have a good understanding of what work actually needs to be done, it’s pretty hard to come up with a reasonable estimate. How can we estimate how long each of these tasks will take?</a:t>
-            </a:r>
+              <a:t>Remember the hurricane model: the smaller the task, the easier it is to estimate the effort it will take.</a:t>
+            </a:r>
+          </a:p>
+          <a:p>
+            <a:endParaRPr lang="en-US" b="0" u="none" dirty="0"/>
+          </a:p>
+          <a:p>
+            <a:r>
+              <a:rPr lang="en-US" b="0" u="none" dirty="0"/>
+              <a:t>Some estimates are better than others:  we’d like our estimates to live down at the bottom of the map, where there is the least uncertainty about where the hurricane will go, or how hard the task will be.</a:t>
+            </a:r>
+          </a:p>
+          <a:p>
+            <a:endParaRPr lang="en-US" b="0" u="none" dirty="0"/>
+          </a:p>
+          <a:p>
+            <a:pPr marL="0" marR="0" lvl="0" indent="0" algn="l" defTabSz="914400" rtl="0" eaLnBrk="1" fontAlgn="auto" latinLnBrk="0" hangingPunct="1">
+              <a:lnSpc>
+                <a:spcPct val="100000"/>
+              </a:lnSpc>
+              <a:spcBef>
+                <a:spcPts val="0"/>
+              </a:spcBef>
+              <a:spcAft>
+                <a:spcPts val="0"/>
+              </a:spcAft>
+              <a:buClrTx/>
+              <a:buSzTx/>
+              <a:buFontTx/>
+              <a:buNone/>
+              <a:tabLst/>
+              <a:defRPr/>
+            </a:pPr>
+            <a:r>
+              <a:rPr lang="en-US" dirty="0"/>
+              <a:t>We don’t know exactly where the hurricane will go, even at the bottom of the map.  Similarly, it is very hard to estimate the number of hours even a small task will take.  (Prof. Wand says: I was doing a very small reorganization of the course activities.  I estimated that it would take me about 30 minutes for each activity, and it wound up take closer to 2 hours each!).</a:t>
+            </a:r>
+          </a:p>
+          <a:p>
+            <a:pPr marL="0" marR="0" lvl="0" indent="0" algn="l" defTabSz="914400" rtl="0" eaLnBrk="1" fontAlgn="auto" latinLnBrk="0" hangingPunct="1">
+              <a:lnSpc>
+                <a:spcPct val="100000"/>
+              </a:lnSpc>
+              <a:spcBef>
+                <a:spcPts val="0"/>
+              </a:spcBef>
+              <a:spcAft>
+                <a:spcPts val="0"/>
+              </a:spcAft>
+              <a:buClrTx/>
+              <a:buSzTx/>
+              <a:buFontTx/>
+              <a:buNone/>
+              <a:tabLst/>
+              <a:defRPr/>
+            </a:pPr>
+            <a:endParaRPr lang="en-US" dirty="0"/>
+          </a:p>
+          <a:p>
+            <a:pPr marL="0" marR="0" lvl="0" indent="0" algn="l" defTabSz="914400" rtl="0" eaLnBrk="1" fontAlgn="auto" latinLnBrk="0" hangingPunct="1">
+              <a:lnSpc>
+                <a:spcPct val="100000"/>
+              </a:lnSpc>
+              <a:spcBef>
+                <a:spcPts val="0"/>
+              </a:spcBef>
+              <a:spcAft>
+                <a:spcPts val="0"/>
+              </a:spcAft>
+              <a:buClrTx/>
+              <a:buSzTx/>
+              <a:buFontTx/>
+              <a:buNone/>
+              <a:tabLst/>
+              <a:defRPr/>
+            </a:pPr>
+            <a:r>
+              <a:rPr lang="en-US" dirty="0"/>
+              <a:t>It’s often easier to measure the *relative* complexity/size of each task. Some tasks are small, others are medium, others are large. This strategy is often called “T-shirt sizing”. </a:t>
+            </a:r>
+          </a:p>
+          <a:p>
+            <a:pPr marL="0" marR="0" lvl="0" indent="0" algn="l" defTabSz="914400" rtl="0" eaLnBrk="1" fontAlgn="auto" latinLnBrk="0" hangingPunct="1">
+              <a:lnSpc>
+                <a:spcPct val="100000"/>
+              </a:lnSpc>
+              <a:spcBef>
+                <a:spcPts val="0"/>
+              </a:spcBef>
+              <a:spcAft>
+                <a:spcPts val="0"/>
+              </a:spcAft>
+              <a:buClrTx/>
+              <a:buSzTx/>
+              <a:buFontTx/>
+              <a:buNone/>
+              <a:tabLst/>
+              <a:defRPr/>
+            </a:pPr>
+            <a:endParaRPr lang="en-US" dirty="0"/>
+          </a:p>
+          <a:p>
+            <a:endParaRPr lang="en-US" b="0" u="none" dirty="0"/>
           </a:p>
         </p:txBody>
       </p:sp>
@@ -710,7 +1062,7 @@
     </p:spTree>
     <p:extLst>
       <p:ext uri="{BB962C8B-B14F-4D97-AF65-F5344CB8AC3E}">
-        <p14:creationId xmlns:p14="http://schemas.microsoft.com/office/powerpoint/2010/main" val="694661729"/>
+        <p14:creationId xmlns:p14="http://schemas.microsoft.com/office/powerpoint/2010/main" val="3561658757"/>
       </p:ext>
     </p:extLst>
   </p:cSld>
@@ -766,40 +1118,37 @@
           <a:p>
             <a:r>
               <a:rPr lang="en-US" dirty="0"/>
-              <a:t>None of us is as smart as all of us, particularly when it comes to thinking through the complexities and details of development tasks: how long will something really take? Estimation is a team process, best performed </a:t>
-            </a:r>
-            <a:r>
-              <a:rPr lang="en-US" b="1" dirty="0"/>
-              <a:t>by the group who will be doing the work</a:t>
-            </a:r>
-            <a:r>
-              <a:rPr lang="en-US" b="0" dirty="0"/>
-              <a:t>: that is, the development team who will be performing the tasks should be the ones who make the estimate.</a:t>
-            </a:r>
-            <a:endParaRPr lang="en-US" dirty="0"/>
-          </a:p>
-          <a:p>
-            <a:endParaRPr lang="en-US" dirty="0"/>
-          </a:p>
-          <a:p>
-            <a:r>
-              <a:rPr lang="en-US" dirty="0"/>
-              <a:t>Once you get your team together, there are two high–level approaches to take for estimation.</a:t>
-            </a:r>
-          </a:p>
-          <a:p>
-            <a:r>
-              <a:rPr lang="en-US" dirty="0"/>
-              <a:t>First, you can try to estimate the time that each task will take, assigning say, 30 minutes, one or two hours, a day, or a week to a task. Estimating tasks at this level can be really hard: good estimates come from experience, and even a seasoned, experienced developer may not be able to come to a good estimate for a new project.</a:t>
-            </a:r>
-          </a:p>
-          <a:p>
-            <a:endParaRPr lang="en-US" dirty="0"/>
-          </a:p>
-          <a:p>
-            <a:r>
-              <a:rPr lang="en-US" dirty="0"/>
-              <a:t>An alternative approach which is more common is to avoid estimating the actual hours that some task will take, and instead measuring the relative complexity/size of each task. Some tasks are small, others are medium, others are large. This strategy is often called “T-shirt sizing”. Let’s see an example of how one of these meetings might go.</a:t>
+              <a:t>XS are things we really know how to do quite quickly</a:t>
+            </a:r>
+          </a:p>
+          <a:p>
+            <a:r>
+              <a:rPr lang="en-US" dirty="0"/>
+              <a:t>S are a bit bigger. We’ve done this exact task before, it takes more than a few minutes, but we know it can be done with ease</a:t>
+            </a:r>
+          </a:p>
+          <a:p>
+            <a:r>
+              <a:rPr lang="en-US" dirty="0"/>
+              <a:t>M – maybe things we have experience with, but not that exact task.</a:t>
+            </a:r>
+          </a:p>
+          <a:p>
+            <a:r>
+              <a:rPr lang="en-US" dirty="0"/>
+              <a:t>L– challenging task that will need investigation. </a:t>
+            </a:r>
+          </a:p>
+          <a:p>
+            <a:r>
+              <a:rPr lang="en-US" dirty="0"/>
+              <a:t>XL – huge amount of work and complexity. </a:t>
+            </a:r>
+          </a:p>
+          <a:p>
+            <a:r>
+              <a:rPr lang="en-US" dirty="0"/>
+              <a:t>What we like about t-shirt sizes is that they are relative: we define how hard something will be based on what we’ve done before. We also like that they do not directly imply time estimates, because the time estimates are likely to be under-estimates anyway.</a:t>
             </a:r>
           </a:p>
         </p:txBody>
@@ -830,7 +1179,7 @@
     </p:spTree>
     <p:extLst>
       <p:ext uri="{BB962C8B-B14F-4D97-AF65-F5344CB8AC3E}">
-        <p14:creationId xmlns:p14="http://schemas.microsoft.com/office/powerpoint/2010/main" val="676446789"/>
+        <p14:creationId xmlns:p14="http://schemas.microsoft.com/office/powerpoint/2010/main" val="3083387294"/>
       </p:ext>
     </p:extLst>
   </p:cSld>
@@ -886,38 +1235,72 @@
           <a:p>
             <a:r>
               <a:rPr lang="en-US" dirty="0"/>
-              <a:t>XS are things we really know how to do quite quickly</a:t>
-            </a:r>
-          </a:p>
-          <a:p>
-            <a:r>
-              <a:rPr lang="en-US" dirty="0"/>
-              <a:t>S are a bit bigger. We’ve done this exact task before, it takes more than a few minutes, but we know it can be done with ease</a:t>
-            </a:r>
-          </a:p>
-          <a:p>
-            <a:r>
-              <a:rPr lang="en-US" dirty="0"/>
-              <a:t>M – maybe things we have experience with, but not that exact task.</a:t>
-            </a:r>
-          </a:p>
-          <a:p>
-            <a:r>
-              <a:rPr lang="en-US" dirty="0"/>
-              <a:t>L– challenging task that will need investigation. </a:t>
-            </a:r>
-          </a:p>
-          <a:p>
-            <a:r>
-              <a:rPr lang="en-US" dirty="0"/>
-              <a:t>XL – huge amount of work and complexity. </a:t>
-            </a:r>
-          </a:p>
-          <a:p>
-            <a:r>
-              <a:rPr lang="en-US" dirty="0"/>
-              <a:t>What we like about t-shirt sizes is that they are relative: we define how hard something will be based on what we’ve done before. We also like that they do not directly imply time estimates, because the time estimates are likely to be under-estimates anyway.</a:t>
-            </a:r>
+              <a:t>Let’s return to our sprint plan for </a:t>
+            </a:r>
+            <a:r>
+              <a:rPr lang="en-US" dirty="0" err="1"/>
+              <a:t>PlowTracker</a:t>
+            </a:r>
+            <a:r>
+              <a:rPr lang="en-US" dirty="0"/>
+              <a:t>, and see how the team ended up. </a:t>
+            </a:r>
+          </a:p>
+          <a:p>
+            <a:r>
+              <a:rPr lang="en-US" dirty="0"/>
+              <a:t>&lt;Read slide&gt; </a:t>
+            </a:r>
+          </a:p>
+          <a:p>
+            <a:endParaRPr lang="en-US" dirty="0"/>
+          </a:p>
+          <a:p>
+            <a:r>
+              <a:rPr lang="en-US" dirty="0"/>
+              <a:t>Remember that this is a fictitious app; there are more tasks not shown on this slide; we don’t know the background of the team, and there is no claim that this is a “perfect” estimation. We don’t want to make “perfect” estimates anyway, and </a:t>
+            </a:r>
+          </a:p>
+          <a:p>
+            <a:endParaRPr lang="en-US" dirty="0"/>
+          </a:p>
+          <a:p>
+            <a:r>
+              <a:rPr lang="en-US" dirty="0"/>
+              <a:t>(hopefully there is enough here that it can start some discussion amongst the class).</a:t>
+            </a:r>
+          </a:p>
+          <a:p>
+            <a:endParaRPr lang="en-US" dirty="0"/>
+          </a:p>
+          <a:p>
+            <a:endParaRPr lang="en-US" dirty="0"/>
+          </a:p>
+          <a:p>
+            <a:pPr marL="0" marR="0" lvl="0" indent="0" algn="l" defTabSz="914400" rtl="0" eaLnBrk="1" fontAlgn="auto" latinLnBrk="0" hangingPunct="1">
+              <a:lnSpc>
+                <a:spcPct val="100000"/>
+              </a:lnSpc>
+              <a:spcBef>
+                <a:spcPts val="0"/>
+              </a:spcBef>
+              <a:spcAft>
+                <a:spcPts val="0"/>
+              </a:spcAft>
+              <a:buClrTx/>
+              <a:buSzTx/>
+              <a:buFontTx/>
+              <a:buNone/>
+              <a:tabLst/>
+              <a:defRPr/>
+            </a:pPr>
+            <a:r>
+              <a:rPr lang="en-US" dirty="0"/>
+              <a:t>One clear task that should be created (from reading the sizes and rationales) is that the “large” task of “create map interface” needs to be broken down. There are other tasks that depend on knowing how to make the map part work, and if the team isn’t confident in how to do this, it’s better to break it down. How do we know that this is “large” and not “extra-large” or “extra-extra-large”? How will we understand if progress is being made on this task? (see suggestion on next slide)</a:t>
+            </a:r>
+          </a:p>
+          <a:p>
+            <a:endParaRPr lang="en-US" dirty="0"/>
           </a:p>
         </p:txBody>
       </p:sp>
@@ -947,7 +1330,7 @@
     </p:spTree>
     <p:extLst>
       <p:ext uri="{BB962C8B-B14F-4D97-AF65-F5344CB8AC3E}">
-        <p14:creationId xmlns:p14="http://schemas.microsoft.com/office/powerpoint/2010/main" val="3083387294"/>
+        <p14:creationId xmlns:p14="http://schemas.microsoft.com/office/powerpoint/2010/main" val="3606911299"/>
       </p:ext>
     </p:extLst>
   </p:cSld>
@@ -1003,48 +1386,49 @@
           <a:p>
             <a:r>
               <a:rPr lang="en-US" dirty="0"/>
-              <a:t>Let’s return to our sprint plan for </a:t>
+              <a:t>As a result of this planning process, the team might have decided to create some explicit knowledge acquisition tasks: doing some research on a potential API to use for displaying the map (</a:t>
             </a:r>
             <a:r>
               <a:rPr lang="en-US" dirty="0" err="1"/>
-              <a:t>PlowTracker</a:t>
-            </a:r>
-            <a:r>
-              <a:rPr lang="en-US" dirty="0"/>
-              <a:t>, and see how the team ended up. (Read slide. Remember that this is a fictitious app, there are more tasks not shown on this slide, we don’t know the background of the team, and there is no claim that this is a “perfect” estimation. We don’t want to make “perfect” estimates anyway, and hopefully there is enough here that it can start some discussion amongst the class).</a:t>
+              <a:t>openstreetmap</a:t>
+            </a:r>
+            <a:r>
+              <a:rPr lang="en-US" dirty="0"/>
+              <a:t>), and </a:t>
+            </a:r>
+            <a:r>
+              <a:rPr lang="en-US" dirty="0" err="1"/>
+              <a:t>expliclty</a:t>
+            </a:r>
+            <a:r>
+              <a:rPr lang="en-US" dirty="0"/>
+              <a:t> building a throwaway prototype: a trivial interface that doesn’t satisfy the requirements of your </a:t>
+            </a:r>
+            <a:r>
+              <a:rPr lang="en-US" dirty="0" err="1"/>
+              <a:t>plowtracker</a:t>
+            </a:r>
+            <a:r>
+              <a:rPr lang="en-US" dirty="0"/>
+              <a:t> app, but gets you experience working with </a:t>
+            </a:r>
+            <a:r>
+              <a:rPr lang="en-US" dirty="0" err="1"/>
+              <a:t>openstreetmap</a:t>
+            </a:r>
+            <a:r>
+              <a:rPr lang="en-US" dirty="0"/>
+              <a:t>. Then, the actual task of putting the map into our app should be more attainable.</a:t>
             </a:r>
           </a:p>
           <a:p>
             <a:endParaRPr lang="en-US" dirty="0"/>
           </a:p>
           <a:p>
-            <a:endParaRPr lang="en-US" dirty="0"/>
-          </a:p>
-          <a:p>
-            <a:pPr marL="0" marR="0" lvl="0" indent="0" algn="l" defTabSz="914400" rtl="0" eaLnBrk="1" fontAlgn="auto" latinLnBrk="0" hangingPunct="1">
-              <a:lnSpc>
-                <a:spcPct val="100000"/>
-              </a:lnSpc>
-              <a:spcBef>
-                <a:spcPts val="0"/>
-              </a:spcBef>
-              <a:spcAft>
-                <a:spcPts val="0"/>
-              </a:spcAft>
-              <a:buClrTx/>
-              <a:buSzTx/>
-              <a:buFontTx/>
-              <a:buNone/>
-              <a:tabLst/>
-              <a:defRPr/>
-            </a:pPr>
-            <a:r>
-              <a:rPr lang="en-US" dirty="0"/>
-              <a:t>One clear task that should be created (from reading the sizes and rationales) is that the “large” task of “create map interface” needs to be broken down. There are other tasks that depend on knowing how to make the map part work, and if the team isn’t confident in how to do this, it’s better to break it down. How do we know that this is “large” and not “extra-large” or “extra-extra-large”? How will we understand if progress is being made on this task? (see suggestion on next slide)</a:t>
-            </a:r>
-          </a:p>
-          <a:p>
-            <a:endParaRPr lang="en-US" dirty="0"/>
+            <a:r>
+              <a:rPr lang="en-US" dirty="0"/>
+              <a:t>[Good spot to pause for activity: What are the user stories? What are the implementation tasks?]  &lt;Is there a module 6 activity?  There isn’t one in the repo).</a:t>
+            </a:r>
           </a:p>
         </p:txBody>
       </p:sp>
@@ -1074,7 +1458,7 @@
     </p:spTree>
     <p:extLst>
       <p:ext uri="{BB962C8B-B14F-4D97-AF65-F5344CB8AC3E}">
-        <p14:creationId xmlns:p14="http://schemas.microsoft.com/office/powerpoint/2010/main" val="3606911299"/>
+        <p14:creationId xmlns:p14="http://schemas.microsoft.com/office/powerpoint/2010/main" val="1422553888"/>
       </p:ext>
     </p:extLst>
   </p:cSld>
@@ -1128,50 +1512,121 @@
           <a:bodyPr/>
           <a:lstStyle/>
           <a:p>
-            <a:r>
-              <a:rPr lang="en-US" dirty="0"/>
-              <a:t>As a result of this planning process, the team might have decided to create some explicit knowledge acquisition tasks: doing some research on a potential API to use for displaying the map (</a:t>
-            </a:r>
-            <a:r>
-              <a:rPr lang="en-US" dirty="0" err="1"/>
-              <a:t>openstreetmap</a:t>
-            </a:r>
-            <a:r>
-              <a:rPr lang="en-US" dirty="0"/>
-              <a:t>), and </a:t>
-            </a:r>
-            <a:r>
-              <a:rPr lang="en-US" dirty="0" err="1"/>
-              <a:t>expliclty</a:t>
-            </a:r>
-            <a:r>
-              <a:rPr lang="en-US" dirty="0"/>
-              <a:t> building a throwaway prototype: a trivial interface that doesn’t satisfy the requirements of your </a:t>
-            </a:r>
-            <a:r>
-              <a:rPr lang="en-US" dirty="0" err="1"/>
-              <a:t>plowtracker</a:t>
-            </a:r>
-            <a:r>
-              <a:rPr lang="en-US" dirty="0"/>
-              <a:t> app, but gets you experience working with </a:t>
-            </a:r>
-            <a:r>
-              <a:rPr lang="en-US" dirty="0" err="1"/>
-              <a:t>openstreetmap</a:t>
-            </a:r>
-            <a:r>
-              <a:rPr lang="en-US" dirty="0"/>
-              <a:t>. Then, the actual task of putting the map into our app should be more attainable.</a:t>
-            </a:r>
-          </a:p>
-          <a:p>
+            <a:pPr marL="0" marR="0" lvl="0" indent="0" algn="l" defTabSz="914400" rtl="0" eaLnBrk="1" fontAlgn="auto" latinLnBrk="0" hangingPunct="1">
+              <a:lnSpc>
+                <a:spcPct val="100000"/>
+              </a:lnSpc>
+              <a:spcBef>
+                <a:spcPts val="0"/>
+              </a:spcBef>
+              <a:spcAft>
+                <a:spcPts val="0"/>
+              </a:spcAft>
+              <a:buClrTx/>
+              <a:buSzTx/>
+              <a:buFontTx/>
+              <a:buNone/>
+              <a:tabLst/>
+              <a:defRPr/>
+            </a:pPr>
+            <a:r>
+              <a:rPr lang="en-US" dirty="0"/>
+              <a:t>Often it’s useful to have a “Sprint 0” to learn about the task and assemble the different knowledge and skill sets that will be needed to complete the project.</a:t>
+            </a:r>
+          </a:p>
+          <a:p>
+            <a:pPr marL="0" marR="0" lvl="0" indent="0" algn="l" defTabSz="914400" rtl="0" eaLnBrk="1" fontAlgn="auto" latinLnBrk="0" hangingPunct="1">
+              <a:lnSpc>
+                <a:spcPct val="100000"/>
+              </a:lnSpc>
+              <a:spcBef>
+                <a:spcPts val="0"/>
+              </a:spcBef>
+              <a:spcAft>
+                <a:spcPts val="0"/>
+              </a:spcAft>
+              <a:buClrTx/>
+              <a:buSzTx/>
+              <a:buFontTx/>
+              <a:buNone/>
+              <a:tabLst/>
+              <a:defRPr/>
+            </a:pPr>
             <a:endParaRPr lang="en-US" dirty="0"/>
           </a:p>
           <a:p>
-            <a:r>
-              <a:rPr lang="en-US" dirty="0"/>
-              <a:t>[Good spot to pause for activity: What are the user stories? What are the implementation tasks?]</a:t>
+            <a:pPr marL="0" marR="0" lvl="0" indent="0" algn="l" defTabSz="914400" rtl="0" eaLnBrk="1" fontAlgn="auto" latinLnBrk="0" hangingPunct="1">
+              <a:lnSpc>
+                <a:spcPct val="100000"/>
+              </a:lnSpc>
+              <a:spcBef>
+                <a:spcPts val="0"/>
+              </a:spcBef>
+              <a:spcAft>
+                <a:spcPts val="0"/>
+              </a:spcAft>
+              <a:buClrTx/>
+              <a:buSzTx/>
+              <a:buFontTx/>
+              <a:buNone/>
+              <a:tabLst/>
+              <a:defRPr/>
+            </a:pPr>
+            <a:r>
+              <a:rPr lang="en-US" dirty="0"/>
+              <a:t>Here are some example things you might do in a Sprint 0.</a:t>
+            </a:r>
+          </a:p>
+          <a:p>
+            <a:pPr marL="0" marR="0" lvl="0" indent="0" algn="l" defTabSz="914400" rtl="0" eaLnBrk="1" fontAlgn="auto" latinLnBrk="0" hangingPunct="1">
+              <a:lnSpc>
+                <a:spcPct val="100000"/>
+              </a:lnSpc>
+              <a:spcBef>
+                <a:spcPts val="0"/>
+              </a:spcBef>
+              <a:spcAft>
+                <a:spcPts val="0"/>
+              </a:spcAft>
+              <a:buClrTx/>
+              <a:buSzTx/>
+              <a:buFontTx/>
+              <a:buNone/>
+              <a:tabLst/>
+              <a:defRPr/>
+            </a:pPr>
+            <a:endParaRPr lang="en-US" dirty="0"/>
+          </a:p>
+          <a:p>
+            <a:pPr marL="0" marR="0" lvl="0" indent="0" algn="l" defTabSz="914400" rtl="0" eaLnBrk="1" fontAlgn="auto" latinLnBrk="0" hangingPunct="1">
+              <a:lnSpc>
+                <a:spcPct val="100000"/>
+              </a:lnSpc>
+              <a:spcBef>
+                <a:spcPts val="0"/>
+              </a:spcBef>
+              <a:spcAft>
+                <a:spcPts val="0"/>
+              </a:spcAft>
+              <a:buClrTx/>
+              <a:buSzTx/>
+              <a:buFontTx/>
+              <a:buNone/>
+              <a:tabLst/>
+              <a:defRPr/>
+            </a:pPr>
+            <a:r>
+              <a:rPr lang="en-US" dirty="0"/>
+              <a:t>. (read slide)</a:t>
+            </a:r>
+          </a:p>
+          <a:p>
+            <a:endParaRPr lang="en-US" dirty="0"/>
+          </a:p>
+          <a:p>
+            <a:r>
+              <a:rPr lang="en-US" dirty="0"/>
+              <a:t>Note that the goal here is NOT to learn _everything_ that you need to know in order to complete the project: if you did that, you would be doing the waterfall thing. Instead, the goal is to learn just enough to create responsible estimates. Not a perfect one. Not an ill-informed one. Just a “responsible” estimate.</a:t>
             </a:r>
           </a:p>
         </p:txBody>
@@ -1202,7 +1657,7 @@
     </p:spTree>
     <p:extLst>
       <p:ext uri="{BB962C8B-B14F-4D97-AF65-F5344CB8AC3E}">
-        <p14:creationId xmlns:p14="http://schemas.microsoft.com/office/powerpoint/2010/main" val="1422553888"/>
+        <p14:creationId xmlns:p14="http://schemas.microsoft.com/office/powerpoint/2010/main" val="1712240600"/>
       </p:ext>
     </p:extLst>
   </p:cSld>
@@ -1275,7 +1730,7 @@
             </a:pPr>
             <a:r>
               <a:rPr lang="en-US" dirty="0"/>
-              <a:t>What if we are trying this for the first time. Maybe you are planning out your team project. In the context of the project in the second half of the semester, you might find that there are some technologies that you want to work with, but have no idea how to estimate how hard it is. Starting a truly “greenfield” project (no existing code or design) will involve even more of these issues, particularly if your solution space is vast (what language do we use? What off-the-shelf components can we reuse?). Thankfully, for the term project you won’t be starting entirely from scratch, because you are building on an existing codebase, and you will have completed three sprints to get up to speed on it (HW2, HW3, HW4).</a:t>
+              <a:t>Now that we have our sprint planned and the sprint backlogged defined, it’s time to start to actually do the work and complete the tasks. During the sprint, we have a recurring meeting called the Daily Scrum.  The meeting is organized around the Scrum Questions:</a:t>
             </a:r>
           </a:p>
           <a:p>
@@ -1284,7 +1739,7 @@
           <a:p>
             <a:r>
               <a:rPr lang="en-US" dirty="0"/>
-              <a:t>A general strategy to improve estimations is to create a “sprint 0” that focuses on knowledge-generation techniques to help you learn what you need to do. Here are some examples of those kinds of tasks and questions that they might help answer. (read slide)</a:t>
+              <a:t>(Read questions)</a:t>
             </a:r>
           </a:p>
           <a:p>
@@ -1293,16 +1748,29 @@
           <a:p>
             <a:r>
               <a:rPr lang="en-US" dirty="0"/>
-              <a:t>Note that the goal here is NOT to learn _everything_ that you need to know in order to complete the project: if you did that, you would be doing the waterfall thing. Instead, the goal is to learn just enough to create a responsible estimate. Not a perfect one. Not an </a:t>
-            </a:r>
-            <a:r>
-              <a:rPr lang="en-US" dirty="0" err="1"/>
-              <a:t>illinformed</a:t>
-            </a:r>
-            <a:r>
-              <a:rPr lang="en-US" dirty="0"/>
-              <a:t> one. Just a “responsible” estimate.</a:t>
-            </a:r>
+              <a:t>Why?</a:t>
+            </a:r>
+          </a:p>
+          <a:p>
+            <a:endParaRPr lang="en-US" dirty="0"/>
+          </a:p>
+          <a:p>
+            <a:r>
+              <a:rPr lang="en-US" dirty="0"/>
+              <a:t>Provides a framework for team to share information. What are people working on? How are we aligned with delivering value?</a:t>
+            </a:r>
+          </a:p>
+          <a:p>
+            <a:endParaRPr lang="en-US" dirty="0"/>
+          </a:p>
+          <a:p>
+            <a:r>
+              <a:rPr lang="en-US" dirty="0"/>
+              <a:t>To the extent to which we are “agile”, we need to be able to adapt. We can adapt when we share what’s working and what’s not working, and then can work together to try to fix it. This is not the meeting where the decision of “how to fix it” is determined, but is the meeting that elicits the fact that a fix needs to be constructed. </a:t>
+            </a:r>
+          </a:p>
+          <a:p>
+            <a:endParaRPr lang="en-US" dirty="0"/>
           </a:p>
         </p:txBody>
       </p:sp>
@@ -1332,7 +1800,7 @@
     </p:spTree>
     <p:extLst>
       <p:ext uri="{BB962C8B-B14F-4D97-AF65-F5344CB8AC3E}">
-        <p14:creationId xmlns:p14="http://schemas.microsoft.com/office/powerpoint/2010/main" val="1712240600"/>
+        <p14:creationId xmlns:p14="http://schemas.microsoft.com/office/powerpoint/2010/main" val="883911049"/>
       </p:ext>
     </p:extLst>
   </p:cSld>
@@ -1405,38 +1873,97 @@
             </a:pPr>
             <a:r>
               <a:rPr lang="en-US" dirty="0"/>
-              <a:t>Now that we have our sprint planned and the sprint backlogged defined, it’s time to start to actually do the work and complete the tasks. During the sprint, we have a recurring meeting called the Daily Scrum.</a:t>
-            </a:r>
-          </a:p>
-          <a:p>
+              <a:t>This basic scrum model assumes that your team consists of full-time developers who can meet on a daily basis.   Since you are students with many conflicting responsibilities, it is unlikely that you will be able to arrange a daily in-person (or even on-line) meeting.   So to make progress and get the benefits of the scrum/agile process, you will need to adapt (and be agile!).</a:t>
+            </a:r>
+          </a:p>
+          <a:p>
+            <a:pPr marL="0" marR="0" lvl="0" indent="0" algn="l" defTabSz="914400" rtl="0" eaLnBrk="1" fontAlgn="auto" latinLnBrk="0" hangingPunct="1">
+              <a:lnSpc>
+                <a:spcPct val="100000"/>
+              </a:lnSpc>
+              <a:spcBef>
+                <a:spcPts val="0"/>
+              </a:spcBef>
+              <a:spcAft>
+                <a:spcPts val="0"/>
+              </a:spcAft>
+              <a:buClrTx/>
+              <a:buSzTx/>
+              <a:buFontTx/>
+              <a:buNone/>
+              <a:tabLst/>
+              <a:defRPr/>
+            </a:pPr>
             <a:endParaRPr lang="en-US" dirty="0"/>
           </a:p>
           <a:p>
-            <a:r>
-              <a:rPr lang="en-US" dirty="0"/>
-              <a:t>(Read questions)</a:t>
-            </a:r>
-          </a:p>
-          <a:p>
+            <a:pPr marL="0" marR="0" lvl="0" indent="0" algn="l" defTabSz="914400" rtl="0" eaLnBrk="1" fontAlgn="auto" latinLnBrk="0" hangingPunct="1">
+              <a:lnSpc>
+                <a:spcPct val="100000"/>
+              </a:lnSpc>
+              <a:spcBef>
+                <a:spcPts val="0"/>
+              </a:spcBef>
+              <a:spcAft>
+                <a:spcPts val="0"/>
+              </a:spcAft>
+              <a:buClrTx/>
+              <a:buSzTx/>
+              <a:buFontTx/>
+              <a:buNone/>
+              <a:tabLst/>
+              <a:defRPr/>
+            </a:pPr>
+            <a:r>
+              <a:rPr lang="en-US" dirty="0"/>
+              <a:t>Here are some adaptations for doing scrum/agile in our environment.   </a:t>
+            </a:r>
+          </a:p>
+          <a:p>
+            <a:pPr marL="0" marR="0" lvl="0" indent="0" algn="l" defTabSz="914400" rtl="0" eaLnBrk="1" fontAlgn="auto" latinLnBrk="0" hangingPunct="1">
+              <a:lnSpc>
+                <a:spcPct val="100000"/>
+              </a:lnSpc>
+              <a:spcBef>
+                <a:spcPts val="0"/>
+              </a:spcBef>
+              <a:spcAft>
+                <a:spcPts val="0"/>
+              </a:spcAft>
+              <a:buClrTx/>
+              <a:buSzTx/>
+              <a:buFontTx/>
+              <a:buNone/>
+              <a:tabLst/>
+              <a:defRPr/>
+            </a:pPr>
             <a:endParaRPr lang="en-US" dirty="0"/>
           </a:p>
           <a:p>
-            <a:r>
-              <a:rPr lang="en-US" dirty="0"/>
-              <a:t>Why?</a:t>
-            </a:r>
-          </a:p>
-          <a:p>
-            <a:r>
-              <a:rPr lang="en-US" dirty="0"/>
-              <a:t>Provides a framework for team to share information. What are people working on? How are we aligned with delivering value?</a:t>
-            </a:r>
-          </a:p>
-          <a:p>
-            <a:r>
-              <a:rPr lang="en-US" dirty="0"/>
-              <a:t>To the extent to which we are “agile”, we need to be able to adapt. We can adapt when we share what’s working and what’s not working, and then can work together to try to fix it. This is not the meeting where the decision of “how to fix it” is determined, but is the meeting that elicits the fact that a fix needs to be constructed. </a:t>
-            </a:r>
+            <a:pPr marL="0" marR="0" lvl="0" indent="0" algn="l" defTabSz="914400" rtl="0" eaLnBrk="1" fontAlgn="auto" latinLnBrk="0" hangingPunct="1">
+              <a:lnSpc>
+                <a:spcPct val="100000"/>
+              </a:lnSpc>
+              <a:spcBef>
+                <a:spcPts val="0"/>
+              </a:spcBef>
+              <a:spcAft>
+                <a:spcPts val="0"/>
+              </a:spcAft>
+              <a:buClrTx/>
+              <a:buSzTx/>
+              <a:buFontTx/>
+              <a:buNone/>
+              <a:tabLst/>
+              <a:defRPr/>
+            </a:pPr>
+            <a:r>
+              <a:rPr lang="en-US" dirty="0"/>
+              <a:t>In addition to the weekly TA check-in, we will have some weekly deliverables, both individually and for your team.   These may vary between instructors, and we will tell you about them when the time comes.</a:t>
+            </a:r>
+          </a:p>
+          <a:p>
+            <a:endParaRPr lang="en-US" dirty="0"/>
           </a:p>
         </p:txBody>
       </p:sp>
@@ -1466,7 +1993,7 @@
     </p:spTree>
     <p:extLst>
       <p:ext uri="{BB962C8B-B14F-4D97-AF65-F5344CB8AC3E}">
-        <p14:creationId xmlns:p14="http://schemas.microsoft.com/office/powerpoint/2010/main" val="883911049"/>
+        <p14:creationId xmlns:p14="http://schemas.microsoft.com/office/powerpoint/2010/main" val="3254640599"/>
       </p:ext>
     </p:extLst>
   </p:cSld>
@@ -1829,6 +2356,17 @@
           <a:p>
             <a:r>
               <a:rPr lang="en-US" dirty="0"/>
+              <a:t>&lt;may skip </a:t>
+            </a:r>
+            <a:r>
+              <a:rPr lang="en-US"/>
+              <a:t>this text&gt;</a:t>
+            </a:r>
+            <a:endParaRPr lang="en-US" dirty="0"/>
+          </a:p>
+          <a:p>
+            <a:r>
+              <a:rPr lang="en-US" dirty="0"/>
               <a:t>Everyone’s biggest question with estimation is: “When will the feature (or entire project) be delivered?”</a:t>
             </a:r>
           </a:p>
@@ -1840,6 +2378,12 @@
           </a:p>
           <a:p>
             <a:endParaRPr lang="en-US" dirty="0"/>
+          </a:p>
+          <a:p>
+            <a:r>
+              <a:rPr lang="en-US" dirty="0"/>
+              <a:t>&lt;may skip this text&gt;</a:t>
+            </a:r>
           </a:p>
           <a:p>
             <a:r>
@@ -2334,155 +2878,31 @@
           <a:bodyPr/>
           <a:lstStyle/>
           <a:p>
-            <a:pPr marL="0" marR="0" lvl="0" indent="0" algn="l" defTabSz="914400" rtl="0" eaLnBrk="1" fontAlgn="auto" latinLnBrk="0" hangingPunct="1">
-              <a:lnSpc>
-                <a:spcPct val="100000"/>
-              </a:lnSpc>
-              <a:spcBef>
-                <a:spcPts val="0"/>
-              </a:spcBef>
-              <a:spcAft>
-                <a:spcPts val="0"/>
-              </a:spcAft>
-              <a:buClrTx/>
-              <a:buSzTx/>
-              <a:buFontTx/>
-              <a:buNone/>
-              <a:tabLst/>
-              <a:defRPr/>
-            </a:pPr>
-            <a:r>
-              <a:rPr lang="en-US" dirty="0"/>
-              <a:t>Recall that in Module 1.2, in the context of requirements, we talked briefly about how it can be difficult to determine which requirements we could actually implement. Assuming that we are starting off on some new project, we might be negotiating the requirements for the project with a customer – having an opportunity to determine the scope and quality of a project, given a certain cost, and possibly given a certain duration.</a:t>
-            </a:r>
-          </a:p>
-          <a:p>
-            <a:pPr marL="0" marR="0" lvl="0" indent="0" algn="l" defTabSz="914400" rtl="0" eaLnBrk="1" fontAlgn="auto" latinLnBrk="0" hangingPunct="1">
-              <a:lnSpc>
-                <a:spcPct val="100000"/>
-              </a:lnSpc>
-              <a:spcBef>
-                <a:spcPts val="0"/>
-              </a:spcBef>
-              <a:spcAft>
-                <a:spcPts val="0"/>
-              </a:spcAft>
-              <a:buClrTx/>
-              <a:buSzTx/>
-              <a:buFontTx/>
-              <a:buNone/>
-              <a:tabLst/>
-              <a:defRPr/>
-            </a:pPr>
+            <a:r>
+              <a:rPr lang="en-US" dirty="0"/>
+              <a:t>In some ways, predicting how long it will take to build some software project is like predicting the path of a hurricane: With state-of-the-art computer models, we can predict with reasonable certainty where the center of a hurricane will move to over the coming hours. If you have lived in an area that is subject to hurricanes, you may be familiar with maps like this. This hurricane track map shows a “cone of uncertainty” of where the center of the storm will move to. </a:t>
+            </a:r>
+          </a:p>
+          <a:p>
             <a:endParaRPr lang="en-US" dirty="0"/>
           </a:p>
           <a:p>
-            <a:pPr marL="0" marR="0" lvl="0" indent="0" algn="l" defTabSz="914400" rtl="0" eaLnBrk="1" fontAlgn="auto" latinLnBrk="0" hangingPunct="1">
-              <a:lnSpc>
-                <a:spcPct val="100000"/>
-              </a:lnSpc>
-              <a:spcBef>
-                <a:spcPts val="0"/>
-              </a:spcBef>
-              <a:spcAft>
-                <a:spcPts val="0"/>
-              </a:spcAft>
-              <a:buClrTx/>
-              <a:buSzTx/>
-              <a:buFontTx/>
-              <a:buNone/>
-              <a:tabLst/>
-              <a:defRPr/>
-            </a:pPr>
-            <a:r>
-              <a:rPr lang="en-US" dirty="0"/>
-              <a:t>(Maybe you did an example for user story generation like the snow plow app: that example would be nice to reference here – “Remember how many different features we came up with? How the heck do we pick some?”</a:t>
-            </a:r>
-          </a:p>
-          <a:p>
-            <a:pPr marL="0" marR="0" lvl="0" indent="0" algn="l" defTabSz="914400" rtl="0" eaLnBrk="1" fontAlgn="auto" latinLnBrk="0" hangingPunct="1">
-              <a:lnSpc>
-                <a:spcPct val="100000"/>
-              </a:lnSpc>
-              <a:spcBef>
-                <a:spcPts val="0"/>
-              </a:spcBef>
-              <a:spcAft>
-                <a:spcPts val="0"/>
-              </a:spcAft>
-              <a:buClrTx/>
-              <a:buSzTx/>
-              <a:buFontTx/>
-              <a:buNone/>
-              <a:tabLst/>
-              <a:defRPr/>
-            </a:pPr>
-            <a:endParaRPr lang="en-US" dirty="0"/>
-          </a:p>
-          <a:p>
-            <a:pPr marL="0" marR="0" lvl="0" indent="0" algn="l" defTabSz="914400" rtl="0" eaLnBrk="1" fontAlgn="auto" latinLnBrk="0" hangingPunct="1">
-              <a:lnSpc>
-                <a:spcPct val="100000"/>
-              </a:lnSpc>
-              <a:spcBef>
-                <a:spcPts val="0"/>
-              </a:spcBef>
-              <a:spcAft>
-                <a:spcPts val="0"/>
-              </a:spcAft>
-              <a:buClrTx/>
-              <a:buSzTx/>
-              <a:buFontTx/>
-              <a:buNone/>
-              <a:tabLst/>
-              <a:defRPr/>
-            </a:pPr>
-            <a:r>
-              <a:rPr lang="en-US" dirty="0"/>
-              <a:t>Sometimes we might have flexibility to say “we need more developers”, but once you’re in the thick of developing some project it can be very hard to all of a sudden “add developers”, because they need to be onboarded, get up to speed, etc.</a:t>
-            </a:r>
-          </a:p>
-          <a:p>
-            <a:pPr marL="0" marR="0" lvl="0" indent="0" algn="l" defTabSz="914400" rtl="0" eaLnBrk="1" fontAlgn="auto" latinLnBrk="0" hangingPunct="1">
-              <a:lnSpc>
-                <a:spcPct val="100000"/>
-              </a:lnSpc>
-              <a:spcBef>
-                <a:spcPts val="0"/>
-              </a:spcBef>
-              <a:spcAft>
-                <a:spcPts val="0"/>
-              </a:spcAft>
-              <a:buClrTx/>
-              <a:buSzTx/>
-              <a:buFontTx/>
-              <a:buNone/>
-              <a:tabLst/>
-              <a:defRPr/>
-            </a:pPr>
-            <a:endParaRPr lang="en-US" dirty="0"/>
-          </a:p>
-          <a:p>
-            <a:pPr marL="0" marR="0" lvl="0" indent="0" algn="l" defTabSz="914400" rtl="0" eaLnBrk="1" fontAlgn="auto" latinLnBrk="0" hangingPunct="1">
-              <a:lnSpc>
-                <a:spcPct val="100000"/>
-              </a:lnSpc>
-              <a:spcBef>
-                <a:spcPts val="0"/>
-              </a:spcBef>
-              <a:spcAft>
-                <a:spcPts val="0"/>
-              </a:spcAft>
-              <a:buClrTx/>
-              <a:buSzTx/>
-              <a:buFontTx/>
-              <a:buNone/>
-              <a:tabLst/>
-              <a:defRPr/>
-            </a:pPr>
-            <a:r>
-              <a:rPr lang="en-US" dirty="0"/>
-              <a:t>So, big big big big question I show do we determine a feasible scope, timeline and quality goals for our project? This topic is the focus for this lesson. This will become extremely relevant once students start to plan their projects!</a:t>
+            <a:r>
+              <a:rPr lang="en-US" dirty="0"/>
+              <a:t>This map was generated by the NWS National Hurricane Center at 10pm on Saturday Aug 28, 2021. You can see that for the next 48 hours it’s pretty clear which direction it’s going, and the size of the track is quite narrow. As time progresses, the quality of the estimate decrea</a:t>
+            </a:r>
+            <a:r>
+              <a:rPr lang="en-US" b="0" u="none" dirty="0"/>
+              <a:t>ses, and the cone gets wider. Ultimately for days 4-5, the cone is shown with a different texture to make clear that this prediction is even less precise. The map even comes with a disclosure that it is only predicting the CENTER of the storm’s path, and not the scope of the impact.</a:t>
+            </a:r>
+          </a:p>
+          <a:p>
+            <a:endParaRPr lang="en-US" b="0" u="none" dirty="0"/>
+          </a:p>
+          <a:p>
+            <a:r>
+              <a:rPr lang="en-US" b="0" u="none" dirty="0"/>
+              <a:t>It is hard to estimate exactly where a software project will be after a few months, but like a hurricane model, as we get more data, our estimates can improve in quality.</a:t>
             </a:r>
           </a:p>
         </p:txBody>
@@ -2513,7 +2933,7 @@
     </p:spTree>
     <p:extLst>
       <p:ext uri="{BB962C8B-B14F-4D97-AF65-F5344CB8AC3E}">
-        <p14:creationId xmlns:p14="http://schemas.microsoft.com/office/powerpoint/2010/main" val="346195192"/>
+        <p14:creationId xmlns:p14="http://schemas.microsoft.com/office/powerpoint/2010/main" val="2044927815"/>
       </p:ext>
     </p:extLst>
   </p:cSld>
@@ -2569,7 +2989,15 @@
           <a:p>
             <a:r>
               <a:rPr lang="en-US" dirty="0"/>
-              <a:t>In some ways, predicting how long it will take to build some software project is like predicting the path of a hurricane: With state-of-the-art computer models, we can predict with reasonable certainty where the center of a hurricane will move to over the coming hours. If you have lived in an area that is subject to hurricanes, you may be familiar with maps like this. This hurricane track map shows a “cone of uncertainty” of where the center of the storm will move to. </a:t>
+              <a:t>With this lesson from meteorology in mind, let’s start to talk about the principles of agile planning. Recall that one of the goals of agile processes is to embrace uncertainty. The first principle is articulated by Martin Fowler in the acronym “YAGNI” (pronounced </a:t>
+            </a:r>
+            <a:r>
+              <a:rPr lang="en-US" dirty="0" err="1"/>
+              <a:t>yag</a:t>
+            </a:r>
+            <a:r>
+              <a:rPr lang="en-US" dirty="0"/>
+              <a:t>-knee).</a:t>
             </a:r>
           </a:p>
           <a:p>
@@ -2578,20 +3006,25 @@
           <a:p>
             <a:r>
               <a:rPr lang="en-US" dirty="0"/>
-              <a:t>This map was generated by the NWS National Hurricane Center at 10pm on Saturday Aug 28, 2021. You can see that for the next 48 hours it’s pretty clear which direction it’s going, and the size of the track is quite narrow. As time progresses, the quality of the estimate decrea</a:t>
-            </a:r>
-            <a:r>
-              <a:rPr lang="en-US" b="0" u="none" dirty="0"/>
-              <a:t>ses, and the cone gets wider. Ultimately for days 4-5, the cone is shown with a different texture to make clear that this prediction is even less precise. The map even comes with a disclosure that it is only predicting the CENTER of the storm’s path, and not the scope of the impact.</a:t>
-            </a:r>
-          </a:p>
-          <a:p>
-            <a:endParaRPr lang="en-US" b="0" u="none" dirty="0"/>
-          </a:p>
-          <a:p>
-            <a:r>
-              <a:rPr lang="en-US" b="0" u="none" dirty="0"/>
-              <a:t>It is hard to estimate exactly where a software project will be after a few months, but like a hurricane model, as we get more data, our estimates can improve in quality.</a:t>
+              <a:t>If we go into a software project with the first principle “embrace change”, then we need to be willing to tolerate changes to our requirements that come from our users. We also need to embrace changes to our process and plans that come from our evolving understanding of what it is that we need to build, and how it should be built.</a:t>
+            </a:r>
+          </a:p>
+          <a:p>
+            <a:endParaRPr lang="en-US" dirty="0"/>
+          </a:p>
+          <a:p>
+            <a:r>
+              <a:rPr lang="en-US" dirty="0"/>
+              <a:t>The YAGNI philosophy argues that pre-maturely planning and implementing features will almost inevitably result in wasted effort and a delayed schedule. Why? Because with a lot of software projects, both we and our customers may not know exactly what it is that is needed until we get closer to needing it. Consider the hurricane map: 5 days out, can we know what degree of preparations should be in Ohio or Indiana, which seem like they might be outside of the track of the storm, but could also be totally outside of the track of the storm?</a:t>
+            </a:r>
+          </a:p>
+          <a:p>
+            <a:endParaRPr lang="en-US" dirty="0"/>
+          </a:p>
+          <a:p>
+            <a:r>
+              <a:rPr lang="en-US" dirty="0"/>
+              <a:t>One risk is that we end up building the totally wrong feature, in which case we wasted time planning and building that feature, plus the cost to continue to maintain and carry this feature that we now implemented, and the cost to delay other more important features. Building the feature in the wrong way also adds the cost to do it right, and even in the best case (where we built the feature correctly), we have still delayed other more important things from getting built</a:t>
             </a:r>
           </a:p>
         </p:txBody>
@@ -2622,7 +3055,7 @@
     </p:spTree>
     <p:extLst>
       <p:ext uri="{BB962C8B-B14F-4D97-AF65-F5344CB8AC3E}">
-        <p14:creationId xmlns:p14="http://schemas.microsoft.com/office/powerpoint/2010/main" val="2044927815"/>
+        <p14:creationId xmlns:p14="http://schemas.microsoft.com/office/powerpoint/2010/main" val="3065071355"/>
       </p:ext>
     </p:extLst>
   </p:cSld>
@@ -2676,17 +3109,66 @@
           <a:bodyPr/>
           <a:lstStyle/>
           <a:p>
-            <a:r>
-              <a:rPr lang="en-US" dirty="0"/>
-              <a:t>With this lesson from meteorology in mind, let’s start to talk about the principles of agile planning. Recall that one of the goals of agile processes is to embrace uncertainty. The first principle is articulated by Martin Fowler in the acronym “YAGNI” (pronounced </a:t>
+            <a:pPr marL="0" marR="0" lvl="0" indent="0" algn="l" defTabSz="914400" rtl="0" eaLnBrk="1" fontAlgn="auto" latinLnBrk="0" hangingPunct="1">
+              <a:lnSpc>
+                <a:spcPct val="100000"/>
+              </a:lnSpc>
+              <a:spcBef>
+                <a:spcPts val="0"/>
+              </a:spcBef>
+              <a:spcAft>
+                <a:spcPts val="0"/>
+              </a:spcAft>
+              <a:buClrTx/>
+              <a:buSzTx/>
+              <a:buFontTx/>
+              <a:buNone/>
+              <a:tabLst/>
+              <a:defRPr/>
+            </a:pPr>
+            <a:r>
+              <a:rPr lang="en-US" dirty="0"/>
+              <a:t>Let’s imagine that t</a:t>
+            </a:r>
+            <a:r>
+              <a:rPr lang="en-US" sz="1200" dirty="0"/>
+              <a:t>he City of Boston is creating a new app to track plow activity and plan plow routes during winter storms. They don’t know what features to include, and can imagine lots of different kinds of users: Plow operators, city officials, business owners, different citizens, etc.</a:t>
+            </a:r>
+            <a:endParaRPr lang="en-US" dirty="0"/>
+          </a:p>
+          <a:p>
+            <a:endParaRPr lang="en-US" dirty="0"/>
+          </a:p>
+          <a:p>
+            <a:r>
+              <a:rPr lang="en-US" dirty="0"/>
+              <a:t>Here’s a small sample of the user stories that might be generated for this application.  We call this list *the product backlog*</a:t>
+            </a:r>
+          </a:p>
+          <a:p>
+            <a:endParaRPr lang="en-US" dirty="0"/>
+          </a:p>
+          <a:p>
+            <a:r>
+              <a:rPr lang="en-US" dirty="0"/>
+              <a:t>Notice that the backlog includes not only the user stories, but a summary of their value, and a priority. Recall that a key aspect of requirements gathering is understanding the value that a specific story adds. Why? Because eventually we’ll end up with this product backlog, which might have hundreds of items on it. How can we practice YAGNI without knowing what that value is? By explicitly stating the value that a user story adds and tracking this in the backlog, it is easier to have a conversation with the customer, where we reassess the priority of different user stories given shifting priorities.</a:t>
+            </a:r>
+          </a:p>
+          <a:p>
+            <a:br>
+              <a:rPr lang="en-US" dirty="0"/>
+            </a:br>
+            <a:r>
+              <a:rPr lang="en-US" dirty="0"/>
+              <a:t>For example, in the 5 user stories shown in this fictious product backlog, we can see that there are two tasks that are core to the very key minimum viable product (MVP) that we can deliver: we need to show drivers what has not been plowed, and track the streets that get plowed. There are surely other features needed for an MVP of our </a:t>
             </a:r>
             <a:r>
               <a:rPr lang="en-US" dirty="0" err="1"/>
-              <a:t>yag</a:t>
-            </a:r>
-            <a:r>
-              <a:rPr lang="en-US" dirty="0"/>
-              <a:t>-knee).</a:t>
+              <a:t>PlowTracker</a:t>
+            </a:r>
+            <a:r>
+              <a:rPr lang="en-US" dirty="0"/>
+              <a:t>, too, but they don’t fit on this slide.</a:t>
             </a:r>
           </a:p>
           <a:p>
@@ -2695,7 +3177,7 @@
           <a:p>
             <a:r>
               <a:rPr lang="en-US" dirty="0"/>
-              <a:t>If we go into a software project with the first principle “embrace change”, then we need to be willing to tolerate changes to our requirements that come from our users. We also need to embrace changes to our process and plans that come from our evolving understanding of what it is that we need to build, and how it should be built.</a:t>
+              <a:t>The third user story has a medium priority, and focuses on providing an interface to allow city officials to project when different streets will be plowed, so that they can have better data to answer complaints when people call in. </a:t>
             </a:r>
           </a:p>
           <a:p>
@@ -2704,7 +3186,7 @@
           <a:p>
             <a:r>
               <a:rPr lang="en-US" dirty="0"/>
-              <a:t>The YAGNI philosophy argues that pre-maturely planning and implementing features will almost inevitably result in wasted effort and a delayed schedule. Why? Because with a lot of software projects, both we and our customers may not know exactly what it is that is needed until we get closer to needing it. Consider the hurricane map: 5 days out, can we know what degree of preparations should be in Ohio or Indiana, which seem like they might be outside of the track of the storm, but could also be totally outside of the track of the storm?</a:t>
+              <a:t>We can imagine a scenario where input from stakeholders leads us to adjust the priorities of these requirements (that is: be Agile!)</a:t>
             </a:r>
           </a:p>
           <a:p>
@@ -2713,8 +3195,26 @@
           <a:p>
             <a:r>
               <a:rPr lang="en-US" dirty="0"/>
-              <a:t>One risk is that we end up building the totally wrong feature, in which case we wasted time planning and building that feature, plus the cost to continue to maintain and carry this feature that we now implemented, and the cost to delay other more important features. Building the feature in the wrong way also adds the cost to do it right, and even in the best case (where we built the feature correctly), we have still delayed other more important things from getting built</a:t>
-            </a:r>
+              <a:t>For example, perhaps after this project was announced, a government transparency group put pressure on the mayor’s office to allow any member of the public to view live plow arrival estimates for any point in the system, a user story that had low priority originally – the plan was to provide access only through an internal system for city officials at first. However, based on pressure from this citizen group, now the mayor really wants to see this public interface available immediately – the priority should be elevated. </a:t>
+            </a:r>
+          </a:p>
+          <a:p>
+            <a:endParaRPr lang="en-US" dirty="0"/>
+          </a:p>
+          <a:p>
+            <a:r>
+              <a:rPr lang="en-US" dirty="0"/>
+              <a:t>Something will need to shift though, how do we still deliver the product? By examining the </a:t>
+            </a:r>
+            <a:r>
+              <a:rPr lang="en-US" i="1" dirty="0"/>
+              <a:t>value</a:t>
+            </a:r>
+            <a:r>
+              <a:rPr lang="en-US" i="0" dirty="0"/>
+              <a:t> that each user story adds, we might be able to come to the conclusion that we can drop the priority of the internal interface (medium), and raise the priority of the public view.</a:t>
+            </a:r>
+            <a:endParaRPr lang="en-US" dirty="0"/>
           </a:p>
         </p:txBody>
       </p:sp>
@@ -2744,7 +3244,7 @@
     </p:spTree>
     <p:extLst>
       <p:ext uri="{BB962C8B-B14F-4D97-AF65-F5344CB8AC3E}">
-        <p14:creationId xmlns:p14="http://schemas.microsoft.com/office/powerpoint/2010/main" val="3065071355"/>
+        <p14:creationId xmlns:p14="http://schemas.microsoft.com/office/powerpoint/2010/main" val="3835814611"/>
       </p:ext>
     </p:extLst>
   </p:cSld>
@@ -2800,65 +3300,19 @@
           <a:p>
             <a:r>
               <a:rPr lang="en-US" dirty="0"/>
-              <a:t>The product backlog is a key tool in agile planning and estimation. The backlog lists all of the user stories for the product. In this case, I took a small sample of the user stories that we discussed (if you did the activity) for the plow tracker application </a:t>
-            </a:r>
-            <a:br>
-              <a:rPr lang="en-US" dirty="0"/>
-            </a:br>
+              <a:t>Then, our product backlog might look more like this: we can easily determine that the internal interface should be lowered in terms of priority, and the public interface should be elevated. The backlog is a living document: an artifact that we can use to spark conversations with our teammates, and with our customers. The backlog tracks the current state of our overall development goals, their priorities, and their values.</a:t>
+            </a:r>
+          </a:p>
+          <a:p>
             <a:endParaRPr lang="en-US" dirty="0"/>
           </a:p>
           <a:p>
             <a:r>
               <a:rPr lang="en-US" dirty="0"/>
-              <a:t>(Here is a brief description: </a:t>
-            </a:r>
-            <a:r>
-              <a:rPr lang="en-US" sz="2000" dirty="0"/>
-              <a:t>The City of Boston is creating a new app to track plow activity and plan plow routes during winter storms. They don’t know what features to include, and can imagine lots of different kinds of users: Plow operators, city officials, business owners, different citizens)</a:t>
-            </a:r>
-          </a:p>
-          <a:p>
-            <a:endParaRPr lang="en-US" dirty="0"/>
-          </a:p>
-          <a:p>
-            <a:r>
-              <a:rPr lang="en-US" dirty="0"/>
-              <a:t>Notice that the backlog includes not only the user stories, but a summary of their value, and a priority. Recall that a key aspect of requirements gathering is understanding the value that a specific story adds. Why? Because eventually we’ll end up with this product backlog, which might have hundreds of items on it. How can we practice YAGNI without knowing what that value is? By explicitly stating the value that a user story adds and tracking this in the backlog, it is easier to have a conversation with the customer, where we reassess the priority of different user stories given shifting priorities.</a:t>
-            </a:r>
-          </a:p>
-          <a:p>
-            <a:br>
-              <a:rPr lang="en-US" dirty="0"/>
-            </a:br>
-            <a:r>
-              <a:rPr lang="en-US" dirty="0"/>
-              <a:t>For example, in the four user stories shown in this fictious product backlog, we can see that there are two tasks that are core to the very key minimum viable product (MVP) that we can deliver: we need to show drivers what has not been plowed, and track the streets that get plowed. There are surely other features needed for an MVP of our </a:t>
-            </a:r>
-            <a:r>
-              <a:rPr lang="en-US" dirty="0" err="1"/>
-              <a:t>PlowTracker</a:t>
-            </a:r>
-            <a:r>
-              <a:rPr lang="en-US" dirty="0"/>
-              <a:t>, too, but they don’t fit on this slide.</a:t>
-            </a:r>
-          </a:p>
-          <a:p>
-            <a:endParaRPr lang="en-US" dirty="0"/>
-          </a:p>
-          <a:p>
-            <a:r>
-              <a:rPr lang="en-US" dirty="0"/>
-              <a:t>The third user story has a medium priority, and focuses on providing an interface to allow city officials to project when different streets will be plowed, so that they can have better data to answer complaints when people call in. There may be uncertainty in this user story. While from a technical perspective it might be easy to say “oh yes, we can build another map display quite easily”, the customer might re-evaluate the value that this feature adds. For example, perhaps after this project was announced, a government transparency group put pressure on the mayor’s office to allow any member of the public to view live plow arrival estimates for any point in the system, a user story that had low priority originally – the plan was to provide access only through an internal system for city officials at first. However, based on pressure from this citizen group, now the mayor really wants to see this public interface available immediately – the priority should be elevated. Something will need to shift though, how do we still deliver the product? By examining the </a:t>
-            </a:r>
-            <a:r>
-              <a:rPr lang="en-US" i="1" dirty="0"/>
-              <a:t>value</a:t>
-            </a:r>
-            <a:r>
-              <a:rPr lang="en-US" i="0" dirty="0"/>
-              <a:t> that each user story adds, we might be able to come to the conclusion that we can drop the priority of the internal interface (medium), and raise the priority of the public view.</a:t>
-            </a:r>
+              <a:t>Notice how YAGNI helped save us from inadvertently making a technical decision that it was easiest to implement the city official’s internal view at the same time as the driver’s interface. We might have started to implement that (since we would need it later, anyway, right?), but then found that we didn’t need it yet, instead needed the public interface more urgently, and are not going to be able to deliver it as quickly because we still haven’t finished implementing the driver’s interface because we wasted time on the city official’s interface.</a:t>
+            </a:r>
+          </a:p>
+          <a:p>
             <a:endParaRPr lang="en-US" dirty="0"/>
           </a:p>
         </p:txBody>
@@ -2889,7 +3343,7 @@
     </p:spTree>
     <p:extLst>
       <p:ext uri="{BB962C8B-B14F-4D97-AF65-F5344CB8AC3E}">
-        <p14:creationId xmlns:p14="http://schemas.microsoft.com/office/powerpoint/2010/main" val="3835814611"/>
+        <p14:creationId xmlns:p14="http://schemas.microsoft.com/office/powerpoint/2010/main" val="365397766"/>
       </p:ext>
     </p:extLst>
   </p:cSld>
@@ -2945,7 +3399,7 @@
           <a:p>
             <a:r>
               <a:rPr lang="en-US" dirty="0"/>
-              <a:t>Then, our product backlog might look more like this: we can easily determine that the internal interface should be lowered in terms of priority, and the public interface should be elevated. The backlog is a living document: an artifact that we can use to spark conversations with our teammates, and with our customers. The backlog tracks the current state of our overall development goals, their priorities, and their values.</a:t>
+              <a:t>So, how do we go from this product backlog to some delivered software? Scrum is the most common approach to organizing agile projects. There are a few key vocabulary terms that you need to understand in order to talk about scrum, which hopefully won’t be too hard to understand. We’ve already seen one of the artifacts that are used in the scrum process: the product backlog.</a:t>
             </a:r>
           </a:p>
           <a:p>
@@ -2954,11 +3408,97 @@
           <a:p>
             <a:r>
               <a:rPr lang="en-US" dirty="0"/>
-              <a:t>Notice how YAGNI helped save us from inadvertently making a technical decision that it was easiest to implement the city official’s internal view at the same time as the driver’s interface. We might have started to implement that (since we would need it later, anyway, right?), but then found that we didn’t need it yet, instead needed the public interface more urgently, and are not going to be able to deliver it as quickly because we still haven’t finished implementing the driver’s interface because we wasted time on the city official’s interface.</a:t>
+              <a:t>Using this product backlog as our starting point, scrum organizes our development activities into *sprints*, which are time-boxed (fixed duration). Most commonly, sprints are 2 weeks, but it’s also not unusual to see a 30-day sprint. In scrum, we focus most of our planning activities on each of these sprints.</a:t>
             </a:r>
           </a:p>
           <a:p>
             <a:endParaRPr lang="en-US" dirty="0"/>
+          </a:p>
+          <a:p>
+            <a:r>
+              <a:rPr lang="en-US" dirty="0"/>
+              <a:t>The first step in a sprint is planning: a meeting with the whole team. For a 2-week sprint this meeting is usually capped at 4 hours, and for a 30-day sprint, capped at 8 hours. In the first half of the meeting, the team decides on what can be done in the sprint, setting goals. Then the team decides on how to do that work, creating detailed tasks that will take one day or less.</a:t>
+            </a:r>
+          </a:p>
+          <a:p>
+            <a:endParaRPr lang="en-US" dirty="0"/>
+          </a:p>
+          <a:p>
+            <a:r>
+              <a:rPr lang="en-US" dirty="0"/>
+              <a:t>During the sprint, there are short, “Daily Scrum” meetings – timeboxed to 15 minutes.</a:t>
+            </a:r>
+          </a:p>
+          <a:p>
+            <a:endParaRPr lang="en-US" dirty="0"/>
+          </a:p>
+          <a:p>
+            <a:r>
+              <a:rPr lang="en-US" dirty="0"/>
+              <a:t>Notice that we apply the principle of time-boxing at all levels, to prevent us from getting side-tracked or mired in details.</a:t>
+            </a:r>
+          </a:p>
+          <a:p>
+            <a:endParaRPr lang="en-US" dirty="0"/>
+          </a:p>
+          <a:p>
+            <a:r>
+              <a:rPr lang="en-US" dirty="0"/>
+              <a:t>At the end, there is a sprint review, including key stakeholders and users.  This should include:</a:t>
+            </a:r>
+          </a:p>
+          <a:p>
+            <a:r>
+              <a:rPr lang="en-US" dirty="0"/>
+              <a:t>-- what tasks were accomplished and which were not?</a:t>
+            </a:r>
+          </a:p>
+          <a:p>
+            <a:r>
+              <a:rPr lang="en-US" dirty="0"/>
+              <a:t>-- what adaptations should we make in the overall plan in order to deliver the desired product?</a:t>
+            </a:r>
+          </a:p>
+          <a:p>
+            <a:r>
+              <a:rPr lang="en-US" dirty="0"/>
+              <a:t>-- how did the team function?  What improvements can we make in the way the team evaluates its performance and reacts to difficulties?  (This is sometimes called “continuous process improvement”).</a:t>
+            </a:r>
+          </a:p>
+          <a:p>
+            <a:endParaRPr lang="en-US" dirty="0"/>
+          </a:p>
+          <a:p>
+            <a:r>
+              <a:rPr lang="en-US" dirty="0"/>
+              <a:t>We  don’t plan the next sprint until we’ve completed the sprint review of the last one, so we can see what adaptations we need to make for the next sprint..</a:t>
+            </a:r>
+          </a:p>
+          <a:p>
+            <a:endParaRPr lang="en-US" dirty="0"/>
+          </a:p>
+          <a:p>
+            <a:r>
+              <a:rPr lang="en-US" dirty="0"/>
+              <a:t>Implementing an effective scrum process is, however, much harder than reading this slide is – it helps to have a deep understanding of the agile principles to get into the right mindset.  (There’s a lucrative business in training Certified Scrum Masters).</a:t>
+            </a:r>
+          </a:p>
+          <a:p>
+            <a:endParaRPr lang="en-US" dirty="0"/>
+          </a:p>
+          <a:p>
+            <a:r>
+              <a:rPr lang="en-US" dirty="0"/>
+              <a:t>We’ll discuss each of these key steps, and continue to use the </a:t>
+            </a:r>
+            <a:r>
+              <a:rPr lang="en-US" dirty="0" err="1"/>
+              <a:t>PlowTracker</a:t>
+            </a:r>
+            <a:r>
+              <a:rPr lang="en-US" dirty="0"/>
+              <a:t> app as a running example.</a:t>
+            </a:r>
           </a:p>
         </p:txBody>
       </p:sp>
@@ -2988,7 +3528,7 @@
     </p:spTree>
     <p:extLst>
       <p:ext uri="{BB962C8B-B14F-4D97-AF65-F5344CB8AC3E}">
-        <p14:creationId xmlns:p14="http://schemas.microsoft.com/office/powerpoint/2010/main" val="365397766"/>
+        <p14:creationId xmlns:p14="http://schemas.microsoft.com/office/powerpoint/2010/main" val="3303371698"/>
       </p:ext>
     </p:extLst>
   </p:cSld>
@@ -3044,7 +3584,7 @@
           <a:p>
             <a:r>
               <a:rPr lang="en-US" dirty="0"/>
-              <a:t>So, how do we go from this product backlog to some delivered software? Scrum is the most common approach to organizing agile projects. There are a few key vocabulary terms that you need to understand in order to talk about scrum, which hopefully won’t be too hard to understand. We’ve already seen one of the artifacts that are used in the scrum process: the product backlog.</a:t>
+              <a:t>When we plan for a sprint, we start by selecting user stories that we would like to implement, and decompose those stories into tasks. </a:t>
             </a:r>
           </a:p>
           <a:p>
@@ -3053,7 +3593,7 @@
           <a:p>
             <a:r>
               <a:rPr lang="en-US" dirty="0"/>
-              <a:t>Using this product backlog as our starting point, scrum organizes our development activities into sprints, which are time-boxed (fixed duration). Most commonly, sprints are 2 weeks, but it’s also not unusual to see a 30-day sprint. In scrum, we focus most of our planning activities on each of these sprints</a:t>
+              <a:t>Discuss prioritization: how do you determine what to do first? Hopefully based on mutual understanding of the value of each story. This is again why it is so important to talk about what the “value” of some feature is.</a:t>
             </a:r>
           </a:p>
           <a:p>
@@ -3062,7 +3602,7 @@
           <a:p>
             <a:r>
               <a:rPr lang="en-US" dirty="0"/>
-              <a:t>The first phase of a sprint is planning: a meeting with the whole team. For a 2-week sprint this meeting is usually capped at 4 hours, and for a 30-day sprint, capped at 8 hours. In the first half of the meeting, the team decides on what can be done in the sprint, setting goals. Then the team decides on how to do that work, creating detailed tasks that will take one day or less. </a:t>
+              <a:t>Then we decompose the stories into individual tasks. We don’t estimate the duration of each story directly, but instead do a work breakdown first, and then estimate the duration of each task to come up with a rough timeline for an overall story/feature.</a:t>
             </a:r>
           </a:p>
           <a:p>
@@ -3071,7 +3611,7 @@
           <a:p>
             <a:r>
               <a:rPr lang="en-US" dirty="0"/>
-              <a:t>During the sprint, there are short, “Daily Scrum” meetings – timeboxed to 15 minutes.</a:t>
+              <a:t>The entire team comes together for this planning meeting, so it is important to not waste time. If you don’t plan everything in detail, that’s OK, because your agile principles tell you to make decisions as late as possible – some planning will always be done at the last responsible moment. Remember what this is in response to: the waterfall “plan everything in advance” model. This is not that kind of meeting.</a:t>
             </a:r>
           </a:p>
           <a:p>
@@ -3080,33 +3620,37 @@
           <a:p>
             <a:r>
               <a:rPr lang="en-US" dirty="0"/>
-              <a:t>At the end, there is a sprint review of what was done, including key stakeholders and users, and a retrospective of what went well or could be improved.</a:t>
-            </a:r>
-          </a:p>
-          <a:p>
-            <a:endParaRPr lang="en-US" dirty="0"/>
-          </a:p>
-          <a:p>
-            <a:r>
-              <a:rPr lang="en-US" dirty="0"/>
-              <a:t>Do not plan the next sprint until the last one is complete.</a:t>
-            </a:r>
-          </a:p>
-          <a:p>
-            <a:endParaRPr lang="en-US" dirty="0"/>
-          </a:p>
-          <a:p>
-            <a:r>
-              <a:rPr lang="en-US" dirty="0"/>
-              <a:t>Implementing an effective scrum process is, however, much harder than reading this slide is – it helps to have a deep understanding of the agile principles to get into the right mindset. In particular, it’s important to reflect on the way that your team can inspect its performance and adapt to change. We’ll discuss each of these key steps, and continue to use the </a:t>
-            </a:r>
-            <a:r>
-              <a:rPr lang="en-US" dirty="0" err="1"/>
-              <a:t>PlowTracker</a:t>
-            </a:r>
-            <a:r>
-              <a:rPr lang="en-US" dirty="0"/>
-              <a:t> app as a running example.</a:t>
+              <a:t>When planning a sprint, there may also be a variety of other tasks that need to happen to support the overall product development that do not directly tie to a user story in your product backlog. For example:</a:t>
+            </a:r>
+          </a:p>
+          <a:p>
+            <a:pPr marL="171450" indent="-171450">
+              <a:buFont typeface="Arial" panose="020B0604020202020204" pitchFamily="34" charset="0"/>
+              <a:buChar char="•"/>
+            </a:pPr>
+            <a:r>
+              <a:rPr lang="en-US" dirty="0"/>
+              <a:t>Bug fixes</a:t>
+            </a:r>
+          </a:p>
+          <a:p>
+            <a:pPr marL="171450" indent="-171450">
+              <a:buFont typeface="Arial" panose="020B0604020202020204" pitchFamily="34" charset="0"/>
+              <a:buChar char="•"/>
+            </a:pPr>
+            <a:r>
+              <a:rPr lang="en-US" dirty="0"/>
+              <a:t>More general quality improvements: performance, security, other non-functional requirements</a:t>
+            </a:r>
+          </a:p>
+          <a:p>
+            <a:pPr marL="171450" indent="-171450">
+              <a:buFont typeface="Arial" panose="020B0604020202020204" pitchFamily="34" charset="0"/>
+              <a:buChar char="•"/>
+            </a:pPr>
+            <a:r>
+              <a:rPr lang="en-US" dirty="0"/>
+              <a:t>Knowledge acquisition: learning more about the domain, or learning more about specialized technologies that you need</a:t>
             </a:r>
           </a:p>
         </p:txBody>
@@ -3137,7 +3681,7 @@
     </p:spTree>
     <p:extLst>
       <p:ext uri="{BB962C8B-B14F-4D97-AF65-F5344CB8AC3E}">
-        <p14:creationId xmlns:p14="http://schemas.microsoft.com/office/powerpoint/2010/main" val="3303371698"/>
+        <p14:creationId xmlns:p14="http://schemas.microsoft.com/office/powerpoint/2010/main" val="2075699003"/>
       </p:ext>
     </p:extLst>
   </p:cSld>
@@ -3193,7 +3737,15 @@
           <a:p>
             <a:r>
               <a:rPr lang="en-US" dirty="0"/>
-              <a:t>When we plan for a sprint, we start by selecting user stories that we would like to implement, and decompose those stories into tasks. </a:t>
+              <a:t>Here’s an example of a sprint backlog that decomposes two of the </a:t>
+            </a:r>
+            <a:r>
+              <a:rPr lang="en-US" dirty="0" err="1"/>
+              <a:t>plowtracker</a:t>
+            </a:r>
+            <a:r>
+              <a:rPr lang="en-US" dirty="0"/>
+              <a:t> user stories into individual tasks. This list of tasks may not be fully exhaustive. Important to note that they are grouped in some logical manner that might help us organize who works on what, and that there are design, test, and implementation tasks in here.</a:t>
             </a:r>
           </a:p>
           <a:p>
@@ -3202,64 +3754,7 @@
           <a:p>
             <a:r>
               <a:rPr lang="en-US" dirty="0"/>
-              <a:t>Discuss prioritization: how do you determine what to do first? Hopefully based on mutual understanding of the value of each story. This is again why it is so important to talk about what the “value” of some feature is.</a:t>
-            </a:r>
-          </a:p>
-          <a:p>
-            <a:endParaRPr lang="en-US" dirty="0"/>
-          </a:p>
-          <a:p>
-            <a:r>
-              <a:rPr lang="en-US" dirty="0"/>
-              <a:t>Then we decompose the stories into individual tasks. We don’t estimate the duration of each story directly, but instead do a work breakdown first, and then estimate the duration of each task to come up with a rough timeline for an overall story/feature.</a:t>
-            </a:r>
-          </a:p>
-          <a:p>
-            <a:endParaRPr lang="en-US" dirty="0"/>
-          </a:p>
-          <a:p>
-            <a:r>
-              <a:rPr lang="en-US" dirty="0"/>
-              <a:t>The entire team comes together for this planning meeting, so it is important to not waste time. If you don’t plan everything in detail, that’s OK, because your agile principles tell you to make decisions as late as possible – some planning will always be done at the last responsible moment. Remember what this is in response to: the waterfall “plan everything in advance” model. This is not that kind of meeting.</a:t>
-            </a:r>
-          </a:p>
-          <a:p>
-            <a:endParaRPr lang="en-US" dirty="0"/>
-          </a:p>
-          <a:p>
-            <a:r>
-              <a:rPr lang="en-US" dirty="0"/>
-              <a:t>When planning a sprint, there may also be a variety of other tasks that need to happen to support the overall product development that do not directly tie to a user story in your product backlog. For example:</a:t>
-            </a:r>
-          </a:p>
-          <a:p>
-            <a:pPr marL="171450" indent="-171450">
-              <a:buFont typeface="Arial" panose="020B0604020202020204" pitchFamily="34" charset="0"/>
-              <a:buChar char="•"/>
-            </a:pPr>
-            <a:r>
-              <a:rPr lang="en-US" dirty="0"/>
-              <a:t>Bug fixes</a:t>
-            </a:r>
-          </a:p>
-          <a:p>
-            <a:pPr marL="171450" indent="-171450">
-              <a:buFont typeface="Arial" panose="020B0604020202020204" pitchFamily="34" charset="0"/>
-              <a:buChar char="•"/>
-            </a:pPr>
-            <a:r>
-              <a:rPr lang="en-US" dirty="0"/>
-              <a:t>More general quality improvements: performance, security, other non-functional requirements</a:t>
-            </a:r>
-          </a:p>
-          <a:p>
-            <a:pPr marL="171450" indent="-171450">
-              <a:buFont typeface="Arial" panose="020B0604020202020204" pitchFamily="34" charset="0"/>
-              <a:buChar char="•"/>
-            </a:pPr>
-            <a:r>
-              <a:rPr lang="en-US" dirty="0"/>
-              <a:t>Knowledge acquisition: learning more about the domain, or learning more about specialized technologies that you need</a:t>
+              <a:t>Note: no estimation yet. We can’t estimate until we have the tasks. If you don’t have a good understanding of what work actually needs to be done, it’s pretty hard to come up with a reasonable estimate. How can we estimate how long each of these tasks will take?</a:t>
             </a:r>
           </a:p>
         </p:txBody>
@@ -3290,7 +3785,7 @@
     </p:spTree>
     <p:extLst>
       <p:ext uri="{BB962C8B-B14F-4D97-AF65-F5344CB8AC3E}">
-        <p14:creationId xmlns:p14="http://schemas.microsoft.com/office/powerpoint/2010/main" val="2075699003"/>
+        <p14:creationId xmlns:p14="http://schemas.microsoft.com/office/powerpoint/2010/main" val="694661729"/>
       </p:ext>
     </p:extLst>
   </p:cSld>
@@ -3454,7 +3949,7 @@
           <a:p>
             <a:fld id="{5D2A64DE-480B-420F-9649-4F8E696E08E0}" type="datetime1">
               <a:rPr lang="en-US" smtClean="0"/>
-              <a:t>1/14/2023</a:t>
+              <a:t>1/19/2023</a:t>
             </a:fld>
             <a:endParaRPr lang="en-US"/>
           </a:p>
@@ -3778,7 +4273,7 @@
           <a:p>
             <a:fld id="{EA476A42-A091-4468-A075-64A31BE59948}" type="datetime1">
               <a:rPr lang="en-US" smtClean="0"/>
-              <a:t>1/14/2023</a:t>
+              <a:t>1/19/2023</a:t>
             </a:fld>
             <a:endParaRPr lang="en-US"/>
           </a:p>
@@ -3976,7 +4471,7 @@
           <a:p>
             <a:fld id="{0D3616D0-8311-4107-9726-6B805E7D05BA}" type="datetime1">
               <a:rPr lang="en-US" smtClean="0"/>
-              <a:t>1/14/2023</a:t>
+              <a:t>1/19/2023</a:t>
             </a:fld>
             <a:endParaRPr lang="en-US"/>
           </a:p>
@@ -4184,7 +4679,7 @@
           <a:p>
             <a:fld id="{3BC2557A-5C88-417A-A763-5AC779462A5F}" type="datetime1">
               <a:rPr lang="en-US" smtClean="0"/>
-              <a:t>1/14/2023</a:t>
+              <a:t>1/19/2023</a:t>
             </a:fld>
             <a:endParaRPr lang="en-US"/>
           </a:p>
@@ -4708,7 +5203,7 @@
           <a:p>
             <a:fld id="{07C7BFD4-467E-4EDE-93EA-052F5B39A4E5}" type="datetime1">
               <a:rPr lang="en-US" smtClean="0"/>
-              <a:t>1/14/2023</a:t>
+              <a:t>1/19/2023</a:t>
             </a:fld>
             <a:endParaRPr lang="en-US"/>
           </a:p>
@@ -4958,7 +5453,7 @@
           <a:p>
             <a:fld id="{07C7BFD4-467E-4EDE-93EA-052F5B39A4E5}" type="datetime1">
               <a:rPr lang="en-US" smtClean="0"/>
-              <a:t>1/14/2023</a:t>
+              <a:t>1/19/2023</a:t>
             </a:fld>
             <a:endParaRPr lang="en-US"/>
           </a:p>
@@ -5140,7 +5635,7 @@
           <a:p>
             <a:fld id="{109E55A0-C911-4F03-82FC-7E5926047D46}" type="datetime1">
               <a:rPr lang="en-US" smtClean="0"/>
-              <a:t>1/14/2023</a:t>
+              <a:t>1/19/2023</a:t>
             </a:fld>
             <a:endParaRPr lang="en-US"/>
           </a:p>
@@ -5453,7 +5948,7 @@
           <a:p>
             <a:fld id="{A533CBE2-D5BE-47AC-ADC2-9CDFC1D0CF90}" type="datetime1">
               <a:rPr lang="en-US" smtClean="0"/>
-              <a:t>1/14/2023</a:t>
+              <a:t>1/19/2023</a:t>
             </a:fld>
             <a:endParaRPr lang="en-US"/>
           </a:p>
@@ -5754,7 +6249,7 @@
           <a:p>
             <a:fld id="{39B7EDB1-CE74-4951-85A2-0B01C2128E28}" type="datetime1">
               <a:rPr lang="en-US" smtClean="0"/>
-              <a:t>1/14/2023</a:t>
+              <a:t>1/19/2023</a:t>
             </a:fld>
             <a:endParaRPr lang="en-US"/>
           </a:p>
@@ -6202,7 +6697,7 @@
           <a:p>
             <a:fld id="{2BC7EB92-A5C2-4807-A9DC-9EDE6CBFB241}" type="datetime1">
               <a:rPr lang="en-US" smtClean="0"/>
-              <a:t>1/14/2023</a:t>
+              <a:t>1/19/2023</a:t>
             </a:fld>
             <a:endParaRPr lang="en-US"/>
           </a:p>
@@ -6315,7 +6810,7 @@
           <a:p>
             <a:fld id="{2B7B7EE0-7771-4CD5-9B2B-3550753A54A1}" type="datetime1">
               <a:rPr lang="en-US" smtClean="0"/>
-              <a:t>1/14/2023</a:t>
+              <a:t>1/19/2023</a:t>
             </a:fld>
             <a:endParaRPr lang="en-US"/>
           </a:p>
@@ -6626,7 +7121,7 @@
           <a:p>
             <a:fld id="{F8B318B3-0E87-4416-A9B8-D891968C2727}" type="datetime1">
               <a:rPr lang="en-US" smtClean="0"/>
-              <a:t>1/14/2023</a:t>
+              <a:t>1/19/2023</a:t>
             </a:fld>
             <a:endParaRPr lang="en-US"/>
           </a:p>
@@ -6867,7 +7362,7 @@
           <a:p>
             <a:fld id="{54D997E8-DDEE-43F1-8D9B-F8A1E11DE488}" type="datetime1">
               <a:rPr lang="en-US" smtClean="0"/>
-              <a:t>1/14/2023</a:t>
+              <a:t>1/19/2023</a:t>
             </a:fld>
             <a:endParaRPr lang="en-US"/>
           </a:p>
@@ -7506,7 +8001,7 @@
           <p:cNvPr id="2" name="Title 1">
             <a:extLst>
               <a:ext uri="{FF2B5EF4-FFF2-40B4-BE49-F238E27FC236}">
-                <a16:creationId xmlns:a16="http://schemas.microsoft.com/office/drawing/2014/main" id="{BF181906-AFAD-2443-AA7E-27F23CC0B974}"/>
+                <a16:creationId xmlns:a16="http://schemas.microsoft.com/office/drawing/2014/main" id="{CF77E850-1659-7648-9048-5BB7A05803EA}"/>
               </a:ext>
             </a:extLst>
           </p:cNvPr>
@@ -7515,292 +8010,40 @@
           </p:cNvSpPr>
           <p:nvPr>
             <p:ph type="title"/>
-          </p:nvPr>
-        </p:nvSpPr>
-        <p:spPr/>
-        <p:txBody>
-          <a:bodyPr/>
-          <a:lstStyle/>
-          <a:p>
-            <a:r>
-              <a:rPr lang="en-US" dirty="0"/>
-              <a:t>Planning a Sprint Backlog</a:t>
-            </a:r>
-          </a:p>
-        </p:txBody>
-      </p:sp>
-      <p:sp>
-        <p:nvSpPr>
-          <p:cNvPr id="3" name="Content Placeholder 2">
-            <a:extLst>
-              <a:ext uri="{FF2B5EF4-FFF2-40B4-BE49-F238E27FC236}">
-                <a16:creationId xmlns:a16="http://schemas.microsoft.com/office/drawing/2014/main" id="{9678B439-61A3-F547-A942-3898EA583C22}"/>
-              </a:ext>
-            </a:extLst>
-          </p:cNvPr>
-          <p:cNvSpPr>
-            <a:spLocks noGrp="1"/>
-          </p:cNvSpPr>
-          <p:nvPr>
-            <p:ph idx="1"/>
           </p:nvPr>
         </p:nvSpPr>
         <p:spPr>
           <a:xfrm>
-            <a:off x="838200" y="1500159"/>
-            <a:ext cx="7887346" cy="4998611"/>
+            <a:off x="752301" y="1469835"/>
+            <a:ext cx="4023360" cy="3204134"/>
           </a:xfrm>
         </p:spPr>
         <p:txBody>
-          <a:bodyPr>
-            <a:normAutofit fontScale="92500" lnSpcReduction="20000"/>
+          <a:bodyPr vert="horz" lIns="91440" tIns="45720" rIns="91440" bIns="45720" rtlCol="0" anchor="b">
+            <a:normAutofit fontScale="90000"/>
           </a:bodyPr>
           <a:lstStyle/>
           <a:p>
             <a:r>
-              <a:rPr lang="en-US" dirty="0"/>
-              <a:t>Sprint Focus:</a:t>
-            </a:r>
-          </a:p>
-          <a:p>
-            <a:pPr lvl="1"/>
-            <a:r>
-              <a:rPr lang="en-US" dirty="0"/>
-              <a:t>“The driver’s interface should display unplowed streets”</a:t>
-            </a:r>
-          </a:p>
-          <a:p>
-            <a:pPr lvl="1"/>
-            <a:r>
-              <a:rPr lang="en-US" dirty="0"/>
-              <a:t>“The driver’s interface should track which streets have been plowed”</a:t>
-            </a:r>
-          </a:p>
-          <a:p>
-            <a:r>
-              <a:rPr lang="en-US" dirty="0"/>
-              <a:t>Sprint tasks:</a:t>
-            </a:r>
-          </a:p>
-          <a:p>
-            <a:pPr lvl="1"/>
-            <a:r>
-              <a:rPr lang="en-US" dirty="0"/>
-              <a:t>Tasks for API design</a:t>
-            </a:r>
-          </a:p>
-          <a:p>
-            <a:pPr lvl="2"/>
-            <a:r>
-              <a:rPr lang="en-US" dirty="0"/>
-              <a:t>Work out the interface for CRUD on plowed streets</a:t>
-            </a:r>
-          </a:p>
-          <a:p>
-            <a:pPr lvl="1"/>
-            <a:r>
-              <a:rPr lang="en-US" dirty="0"/>
-              <a:t>Tasks for app development</a:t>
-            </a:r>
-          </a:p>
-          <a:p>
-            <a:pPr lvl="2"/>
-            <a:r>
-              <a:rPr lang="en-US" dirty="0"/>
-              <a:t>Design the interface for viewing unplowed streets</a:t>
-            </a:r>
-          </a:p>
-          <a:p>
-            <a:pPr lvl="2"/>
-            <a:r>
-              <a:rPr lang="en-US" dirty="0"/>
-              <a:t>Create the map interface that shows streets in the city</a:t>
-            </a:r>
-          </a:p>
-          <a:p>
-            <a:pPr lvl="2"/>
-            <a:r>
-              <a:rPr lang="en-US" dirty="0"/>
-              <a:t>Fetch unplowed streets from API and update the map</a:t>
-            </a:r>
-          </a:p>
-          <a:p>
-            <a:pPr lvl="2"/>
-            <a:r>
-              <a:rPr lang="en-US" dirty="0"/>
-              <a:t>Update the API with current location while plowing in progress</a:t>
-            </a:r>
-          </a:p>
-          <a:p>
-            <a:pPr lvl="1"/>
-            <a:r>
-              <a:rPr lang="en-US" dirty="0"/>
-              <a:t>Tasks for backend development</a:t>
-            </a:r>
-          </a:p>
-          <a:p>
-            <a:pPr lvl="2"/>
-            <a:r>
-              <a:rPr lang="en-US" dirty="0"/>
-              <a:t>Determine how to model and store plowed street data</a:t>
-            </a:r>
-          </a:p>
-          <a:p>
-            <a:pPr lvl="2"/>
-            <a:r>
-              <a:rPr lang="en-US" dirty="0"/>
-              <a:t>Implement tests for expected API behavior</a:t>
-            </a:r>
-          </a:p>
-          <a:p>
-            <a:pPr lvl="2"/>
-            <a:r>
-              <a:rPr lang="en-US" dirty="0"/>
-              <a:t>Implement API to mark street as plowed</a:t>
-            </a:r>
-          </a:p>
-          <a:p>
-            <a:pPr lvl="2"/>
-            <a:r>
-              <a:rPr lang="en-US" dirty="0"/>
-              <a:t>Implement API to fetch unplowed streets</a:t>
-            </a:r>
-          </a:p>
-        </p:txBody>
-      </p:sp>
-      <p:sp>
-        <p:nvSpPr>
-          <p:cNvPr id="4" name="Slide Number Placeholder 3">
-            <a:extLst>
-              <a:ext uri="{FF2B5EF4-FFF2-40B4-BE49-F238E27FC236}">
-                <a16:creationId xmlns:a16="http://schemas.microsoft.com/office/drawing/2014/main" id="{E9E06C14-8AD7-E641-9D08-C4FCED22BDA2}"/>
-              </a:ext>
-            </a:extLst>
-          </p:cNvPr>
-          <p:cNvSpPr>
-            <a:spLocks noGrp="1"/>
-          </p:cNvSpPr>
-          <p:nvPr>
-            <p:ph type="sldNum" sz="quarter" idx="12"/>
-          </p:nvPr>
-        </p:nvSpPr>
-        <p:spPr/>
-        <p:txBody>
-          <a:bodyPr/>
-          <a:lstStyle/>
-          <a:p>
-            <a:fld id="{20F37917-FD3A-4669-9018-DA04BCDD3D75}" type="slidenum">
-              <a:rPr lang="en-US" smtClean="0"/>
-              <a:t>10</a:t>
-            </a:fld>
-            <a:endParaRPr lang="en-US"/>
-          </a:p>
-        </p:txBody>
-      </p:sp>
-    </p:spTree>
-    <p:extLst>
-      <p:ext uri="{BB962C8B-B14F-4D97-AF65-F5344CB8AC3E}">
-        <p14:creationId xmlns:p14="http://schemas.microsoft.com/office/powerpoint/2010/main" val="2524749999"/>
-      </p:ext>
-    </p:extLst>
-  </p:cSld>
-  <p:clrMapOvr>
-    <a:masterClrMapping/>
-  </p:clrMapOvr>
-</p:sld>
-</file>
-
-<file path=ppt/slides/slide11.xml><?xml version="1.0" encoding="utf-8"?>
-<p:sld xmlns:a="http://schemas.openxmlformats.org/drawingml/2006/main" xmlns:r="http://schemas.openxmlformats.org/officeDocument/2006/relationships" xmlns:p="http://schemas.openxmlformats.org/presentationml/2006/main">
-  <p:cSld>
-    <p:bg>
-      <p:bgPr>
-        <a:solidFill>
-          <a:schemeClr val="bg1"/>
-        </a:solidFill>
-        <a:effectLst/>
-      </p:bgPr>
-    </p:bg>
-    <p:spTree>
-      <p:nvGrpSpPr>
-        <p:cNvPr id="1" name=""/>
-        <p:cNvGrpSpPr/>
-        <p:nvPr/>
-      </p:nvGrpSpPr>
-      <p:grpSpPr>
-        <a:xfrm>
-          <a:off x="0" y="0"/>
-          <a:ext cx="0" cy="0"/>
-          <a:chOff x="0" y="0"/>
-          <a:chExt cx="0" cy="0"/>
-        </a:xfrm>
-      </p:grpSpPr>
-      <p:sp useBgFill="1">
-        <p:nvSpPr>
-          <p:cNvPr id="71" name="Rectangle 70">
-            <a:extLst>
-              <a:ext uri="{FF2B5EF4-FFF2-40B4-BE49-F238E27FC236}">
-                <a16:creationId xmlns:a16="http://schemas.microsoft.com/office/drawing/2014/main" id="{04812C46-200A-4DEB-A05E-3ED6C68C2387}"/>
-              </a:ext>
-              <a:ext uri="{C183D7F6-B498-43B3-948B-1728B52AA6E4}">
-                <adec:decorative xmlns:adec="http://schemas.microsoft.com/office/drawing/2017/decorative" val="1"/>
-              </a:ext>
-            </a:extLst>
-          </p:cNvPr>
-          <p:cNvSpPr>
-            <a:spLocks noGrp="1" noRot="1" noChangeAspect="1" noMove="1" noResize="1" noEditPoints="1" noAdjustHandles="1" noChangeArrowheads="1" noChangeShapeType="1" noTextEdit="1"/>
-          </p:cNvSpPr>
-          <p:nvPr>
-            <p:extLst>
-              <p:ext uri="{386F3935-93C4-4BCD-93E2-E3B085C9AB24}">
-                <p16:designElem xmlns:p16="http://schemas.microsoft.com/office/powerpoint/2015/main" val="1"/>
-              </p:ext>
-            </p:extLst>
-          </p:nvPr>
-        </p:nvSpPr>
-        <p:spPr>
-          <a:xfrm>
-            <a:off x="-1" y="0"/>
-            <a:ext cx="12188952" cy="6858000"/>
-          </a:xfrm>
-          <a:prstGeom prst="rect">
-            <a:avLst/>
-          </a:prstGeom>
-          <a:ln>
-            <a:noFill/>
-          </a:ln>
-        </p:spPr>
-        <p:style>
-          <a:lnRef idx="2">
-            <a:schemeClr val="accent1">
-              <a:shade val="50000"/>
-            </a:schemeClr>
-          </a:lnRef>
-          <a:fillRef idx="1">
-            <a:schemeClr val="accent1"/>
-          </a:fillRef>
-          <a:effectRef idx="0">
-            <a:schemeClr val="accent1"/>
-          </a:effectRef>
-          <a:fontRef idx="minor">
-            <a:schemeClr val="lt1"/>
-          </a:fontRef>
-        </p:style>
-        <p:txBody>
-          <a:bodyPr rtlCol="0" anchor="ctr"/>
-          <a:lstStyle/>
-          <a:p>
-            <a:pPr algn="ctr"/>
-            <a:endParaRPr lang="en-US"/>
+              <a:rPr lang="en-US" sz="4800" kern="1200" dirty="0">
+                <a:solidFill>
+                  <a:schemeClr val="tx1"/>
+                </a:solidFill>
+                <a:latin typeface="+mj-lt"/>
+                <a:ea typeface="+mj-ea"/>
+                <a:cs typeface="+mj-cs"/>
+              </a:rPr>
+              <a:t>Estimating the size of each task: Small tasks are easier to estimate</a:t>
+            </a:r>
           </a:p>
         </p:txBody>
       </p:sp>
       <p:pic>
         <p:nvPicPr>
-          <p:cNvPr id="4098" name="Picture 2">
-            <a:extLst>
-              <a:ext uri="{FF2B5EF4-FFF2-40B4-BE49-F238E27FC236}">
-                <a16:creationId xmlns:a16="http://schemas.microsoft.com/office/drawing/2014/main" id="{1256C72F-AF39-7041-B1CC-BF8C7B71A09D}"/>
+          <p:cNvPr id="1030" name="Picture 6">
+            <a:extLst>
+              <a:ext uri="{FF2B5EF4-FFF2-40B4-BE49-F238E27FC236}">
+                <a16:creationId xmlns:a16="http://schemas.microsoft.com/office/drawing/2014/main" id="{7129F5E6-A33E-EB4E-8207-76B05332541B}"/>
               </a:ext>
             </a:extLst>
           </p:cNvPr>
@@ -7809,7 +8052,7 @@
           </p:cNvPicPr>
           <p:nvPr/>
         </p:nvPicPr>
-        <p:blipFill rotWithShape="1">
+        <p:blipFill>
           <a:blip r:embed="rId3">
             <a:extLst>
               <a:ext uri="{28A0092B-C50C-407E-A947-70E740481C1C}">
@@ -7817,13 +8060,14 @@
               </a:ext>
             </a:extLst>
           </a:blip>
-          <a:srcRect l="5884" r="-1" b="-1"/>
-          <a:stretch/>
+          <a:stretch>
+            <a:fillRect/>
+          </a:stretch>
         </p:blipFill>
         <p:spPr bwMode="auto">
           <a:xfrm>
-            <a:off x="1" y="10"/>
-            <a:ext cx="9669642" cy="6857990"/>
+            <a:off x="5414356" y="725751"/>
+            <a:ext cx="6408836" cy="5255245"/>
           </a:xfrm>
           <a:prstGeom prst="rect">
             <a:avLst/>
@@ -7842,198 +8086,28 @@
       </p:pic>
       <p:sp>
         <p:nvSpPr>
-          <p:cNvPr id="73" name="Rectangle 72">
-            <a:extLst>
-              <a:ext uri="{FF2B5EF4-FFF2-40B4-BE49-F238E27FC236}">
-                <a16:creationId xmlns:a16="http://schemas.microsoft.com/office/drawing/2014/main" id="{D1EA859B-E555-4109-94F3-6700E046E008}"/>
-              </a:ext>
-              <a:ext uri="{C183D7F6-B498-43B3-948B-1728B52AA6E4}">
-                <adec:decorative xmlns:adec="http://schemas.microsoft.com/office/drawing/2017/decorative" val="1"/>
-              </a:ext>
-            </a:extLst>
-          </p:cNvPr>
-          <p:cNvSpPr>
-            <a:spLocks noGrp="1" noRot="1" noChangeAspect="1" noMove="1" noResize="1" noEditPoints="1" noAdjustHandles="1" noChangeArrowheads="1" noChangeShapeType="1" noTextEdit="1"/>
-          </p:cNvSpPr>
-          <p:nvPr>
-            <p:extLst>
-              <p:ext uri="{386F3935-93C4-4BCD-93E2-E3B085C9AB24}">
-                <p16:designElem xmlns:p16="http://schemas.microsoft.com/office/powerpoint/2015/main" val="1"/>
-              </p:ext>
-            </p:extLst>
-          </p:nvPr>
-        </p:nvSpPr>
-        <p:spPr>
-          <a:xfrm flipH="1">
-            <a:off x="5125019" y="0"/>
-            <a:ext cx="7066978" cy="6858000"/>
-          </a:xfrm>
-          <a:prstGeom prst="rect">
-            <a:avLst/>
-          </a:prstGeom>
-          <a:gradFill>
-            <a:gsLst>
-              <a:gs pos="48000">
-                <a:schemeClr val="bg1"/>
-              </a:gs>
-              <a:gs pos="35000">
-                <a:schemeClr val="bg1">
-                  <a:alpha val="77000"/>
-                </a:schemeClr>
-              </a:gs>
-              <a:gs pos="19000">
-                <a:schemeClr val="bg1">
-                  <a:alpha val="38000"/>
-                </a:schemeClr>
-              </a:gs>
-              <a:gs pos="0">
-                <a:schemeClr val="bg1">
-                  <a:alpha val="0"/>
-                </a:schemeClr>
-              </a:gs>
-              <a:gs pos="100000">
-                <a:schemeClr val="bg1"/>
-              </a:gs>
-            </a:gsLst>
-            <a:lin ang="10800000" scaled="0"/>
-          </a:gradFill>
-          <a:ln>
-            <a:noFill/>
-          </a:ln>
-        </p:spPr>
-        <p:style>
-          <a:lnRef idx="2">
-            <a:schemeClr val="accent1">
-              <a:shade val="50000"/>
-            </a:schemeClr>
-          </a:lnRef>
-          <a:fillRef idx="1">
-            <a:schemeClr val="accent1"/>
-          </a:fillRef>
-          <a:effectRef idx="0">
-            <a:schemeClr val="accent1"/>
-          </a:effectRef>
-          <a:fontRef idx="minor">
-            <a:schemeClr val="lt1"/>
-          </a:fontRef>
-        </p:style>
-        <p:txBody>
-          <a:bodyPr rtlCol="0" anchor="ctr"/>
-          <a:lstStyle/>
-          <a:p>
-            <a:pPr algn="ctr"/>
-            <a:endParaRPr lang="en-US" dirty="0"/>
-          </a:p>
-        </p:txBody>
-      </p:sp>
-      <p:sp>
-        <p:nvSpPr>
-          <p:cNvPr id="2" name="Title 1">
-            <a:extLst>
-              <a:ext uri="{FF2B5EF4-FFF2-40B4-BE49-F238E27FC236}">
-                <a16:creationId xmlns:a16="http://schemas.microsoft.com/office/drawing/2014/main" id="{772EF68D-CF6C-D44B-9592-B8B12631EAD3}"/>
-              </a:ext>
-            </a:extLst>
-          </p:cNvPr>
-          <p:cNvSpPr>
-            <a:spLocks noGrp="1"/>
-          </p:cNvSpPr>
-          <p:nvPr>
-            <p:ph type="title"/>
+          <p:cNvPr id="4" name="Slide Number Placeholder 3">
+            <a:extLst>
+              <a:ext uri="{FF2B5EF4-FFF2-40B4-BE49-F238E27FC236}">
+                <a16:creationId xmlns:a16="http://schemas.microsoft.com/office/drawing/2014/main" id="{7E07CA74-E5BE-C04A-BE95-BA211668DCB5}"/>
+              </a:ext>
+            </a:extLst>
+          </p:cNvPr>
+          <p:cNvSpPr>
+            <a:spLocks noGrp="1"/>
+          </p:cNvSpPr>
+          <p:nvPr>
+            <p:ph type="sldNum" sz="quarter" idx="12"/>
           </p:nvPr>
         </p:nvSpPr>
         <p:spPr>
           <a:xfrm>
-            <a:off x="7531610" y="365125"/>
-            <a:ext cx="3822189" cy="1899912"/>
+            <a:off x="9847810" y="6356350"/>
+            <a:ext cx="1505989" cy="365125"/>
           </a:xfrm>
         </p:spPr>
         <p:txBody>
-          <a:bodyPr>
-            <a:normAutofit/>
-          </a:bodyPr>
-          <a:lstStyle/>
-          <a:p>
-            <a:r>
-              <a:rPr lang="en-US" sz="4000"/>
-              <a:t>Estimating Task Time</a:t>
-            </a:r>
-          </a:p>
-        </p:txBody>
-      </p:sp>
-      <p:sp>
-        <p:nvSpPr>
-          <p:cNvPr id="3" name="Content Placeholder 2">
-            <a:extLst>
-              <a:ext uri="{FF2B5EF4-FFF2-40B4-BE49-F238E27FC236}">
-                <a16:creationId xmlns:a16="http://schemas.microsoft.com/office/drawing/2014/main" id="{E20A4316-2EC0-FC49-A9B0-5E3422E338CA}"/>
-              </a:ext>
-            </a:extLst>
-          </p:cNvPr>
-          <p:cNvSpPr>
-            <a:spLocks noGrp="1"/>
-          </p:cNvSpPr>
-          <p:nvPr>
-            <p:ph idx="1"/>
-          </p:nvPr>
-        </p:nvSpPr>
-        <p:spPr>
-          <a:xfrm>
-            <a:off x="7531610" y="2434201"/>
-            <a:ext cx="3822189" cy="3742762"/>
-          </a:xfrm>
-        </p:spPr>
-        <p:txBody>
-          <a:bodyPr>
-            <a:normAutofit/>
-          </a:bodyPr>
-          <a:lstStyle/>
-          <a:p>
-            <a:r>
-              <a:rPr lang="en-US" sz="2000" dirty="0"/>
-              <a:t>Collaborative team process:</a:t>
-            </a:r>
-          </a:p>
-          <a:p>
-            <a:pPr lvl="1"/>
-            <a:r>
-              <a:rPr lang="en-US" sz="2000" dirty="0"/>
-              <a:t>Estimate how long each task will take (hard)</a:t>
-            </a:r>
-          </a:p>
-          <a:p>
-            <a:pPr lvl="1"/>
-            <a:r>
-              <a:rPr lang="en-US" sz="2000" dirty="0"/>
-              <a:t>Estimate relative size of each task (easier)</a:t>
-            </a:r>
-          </a:p>
-        </p:txBody>
-      </p:sp>
-      <p:sp>
-        <p:nvSpPr>
-          <p:cNvPr id="4" name="Slide Number Placeholder 3">
-            <a:extLst>
-              <a:ext uri="{FF2B5EF4-FFF2-40B4-BE49-F238E27FC236}">
-                <a16:creationId xmlns:a16="http://schemas.microsoft.com/office/drawing/2014/main" id="{14431E6D-1EAB-D94D-AF5B-F77F762459AB}"/>
-              </a:ext>
-            </a:extLst>
-          </p:cNvPr>
-          <p:cNvSpPr>
-            <a:spLocks noGrp="1"/>
-          </p:cNvSpPr>
-          <p:nvPr>
-            <p:ph type="sldNum" sz="quarter" idx="12"/>
-          </p:nvPr>
-        </p:nvSpPr>
-        <p:spPr>
-          <a:xfrm>
-            <a:off x="8610600" y="6356350"/>
-            <a:ext cx="2743200" cy="365125"/>
-          </a:xfrm>
-        </p:spPr>
-        <p:txBody>
-          <a:bodyPr>
+          <a:bodyPr vert="horz" lIns="91440" tIns="45720" rIns="91440" bIns="45720" rtlCol="0" anchor="ctr">
             <a:normAutofit/>
           </a:bodyPr>
           <a:lstStyle/>
@@ -8044,22 +8118,36 @@
               </a:spcAft>
             </a:pPr>
             <a:fld id="{20F37917-FD3A-4669-9018-DA04BCDD3D75}" type="slidenum">
-              <a:rPr lang="en-US" smtClean="0"/>
+              <a:rPr lang="en-US">
+                <a:solidFill>
+                  <a:schemeClr val="tx1">
+                    <a:lumMod val="50000"/>
+                    <a:lumOff val="50000"/>
+                  </a:schemeClr>
+                </a:solidFill>
+              </a:rPr>
               <a:pPr>
                 <a:spcAft>
                   <a:spcPts val="600"/>
                 </a:spcAft>
               </a:pPr>
-              <a:t>11</a:t>
+              <a:t>10</a:t>
             </a:fld>
-            <a:endParaRPr lang="en-US"/>
+            <a:endParaRPr lang="en-US">
+              <a:solidFill>
+                <a:schemeClr val="tx1">
+                  <a:lumMod val="50000"/>
+                  <a:lumOff val="50000"/>
+                </a:schemeClr>
+              </a:solidFill>
+            </a:endParaRPr>
           </a:p>
         </p:txBody>
       </p:sp>
     </p:spTree>
     <p:extLst>
       <p:ext uri="{BB962C8B-B14F-4D97-AF65-F5344CB8AC3E}">
-        <p14:creationId xmlns:p14="http://schemas.microsoft.com/office/powerpoint/2010/main" val="3558050744"/>
+        <p14:creationId xmlns:p14="http://schemas.microsoft.com/office/powerpoint/2010/main" val="2646015315"/>
       </p:ext>
     </p:extLst>
   </p:cSld>
@@ -8069,7 +8157,7 @@
 </p:sld>
 </file>
 
-<file path=ppt/slides/slide12.xml><?xml version="1.0" encoding="utf-8"?>
+<file path=ppt/slides/slide11.xml><?xml version="1.0" encoding="utf-8"?>
 <p:sld xmlns:a="http://schemas.openxmlformats.org/drawingml/2006/main" xmlns:r="http://schemas.openxmlformats.org/officeDocument/2006/relationships" xmlns:p="http://schemas.openxmlformats.org/presentationml/2006/main">
   <p:cSld>
     <p:spTree>
@@ -8162,7 +8250,7 @@
           <a:p>
             <a:fld id="{20F37917-FD3A-4669-9018-DA04BCDD3D75}" type="slidenum">
               <a:rPr lang="en-US" smtClean="0"/>
-              <a:t>12</a:t>
+              <a:t>11</a:t>
             </a:fld>
             <a:endParaRPr lang="en-US" dirty="0"/>
           </a:p>
@@ -8228,7 +8316,7 @@
 </p:sld>
 </file>
 
-<file path=ppt/slides/slide13.xml><?xml version="1.0" encoding="utf-8"?>
+<file path=ppt/slides/slide12.xml><?xml version="1.0" encoding="utf-8"?>
 <p:sld xmlns:a="http://schemas.openxmlformats.org/drawingml/2006/main" xmlns:r="http://schemas.openxmlformats.org/officeDocument/2006/relationships" xmlns:p="http://schemas.openxmlformats.org/presentationml/2006/main">
   <p:cSld>
     <p:spTree>
@@ -8296,7 +8384,7 @@
           <a:p>
             <a:fld id="{20F37917-FD3A-4669-9018-DA04BCDD3D75}" type="slidenum">
               <a:rPr lang="en-US" smtClean="0"/>
-              <a:t>13</a:t>
+              <a:t>12</a:t>
             </a:fld>
             <a:endParaRPr lang="en-US"/>
           </a:p>
@@ -8864,7 +8952,7 @@
 </p:sld>
 </file>
 
-<file path=ppt/slides/slide14.xml><?xml version="1.0" encoding="utf-8"?>
+<file path=ppt/slides/slide13.xml><?xml version="1.0" encoding="utf-8"?>
 <p:sld xmlns:a="http://schemas.openxmlformats.org/drawingml/2006/main" xmlns:r="http://schemas.openxmlformats.org/officeDocument/2006/relationships" xmlns:p="http://schemas.openxmlformats.org/presentationml/2006/main">
   <p:cSld>
     <p:spTree>
@@ -9225,7 +9313,7 @@
           <a:p>
             <a:fld id="{20F37917-FD3A-4669-9018-DA04BCDD3D75}" type="slidenum">
               <a:rPr lang="en-US" smtClean="0"/>
-              <a:t>14</a:t>
+              <a:t>13</a:t>
             </a:fld>
             <a:endParaRPr lang="en-US"/>
           </a:p>
@@ -9235,6 +9323,158 @@
     <p:extLst>
       <p:ext uri="{BB962C8B-B14F-4D97-AF65-F5344CB8AC3E}">
         <p14:creationId xmlns:p14="http://schemas.microsoft.com/office/powerpoint/2010/main" val="1324572734"/>
+      </p:ext>
+    </p:extLst>
+  </p:cSld>
+  <p:clrMapOvr>
+    <a:masterClrMapping/>
+  </p:clrMapOvr>
+</p:sld>
+</file>
+
+<file path=ppt/slides/slide14.xml><?xml version="1.0" encoding="utf-8"?>
+<p:sld xmlns:a="http://schemas.openxmlformats.org/drawingml/2006/main" xmlns:r="http://schemas.openxmlformats.org/officeDocument/2006/relationships" xmlns:p="http://schemas.openxmlformats.org/presentationml/2006/main">
+  <p:cSld>
+    <p:spTree>
+      <p:nvGrpSpPr>
+        <p:cNvPr id="1" name=""/>
+        <p:cNvGrpSpPr/>
+        <p:nvPr/>
+      </p:nvGrpSpPr>
+      <p:grpSpPr>
+        <a:xfrm>
+          <a:off x="0" y="0"/>
+          <a:ext cx="0" cy="0"/>
+          <a:chOff x="0" y="0"/>
+          <a:chExt cx="0" cy="0"/>
+        </a:xfrm>
+      </p:grpSpPr>
+      <p:sp>
+        <p:nvSpPr>
+          <p:cNvPr id="2" name="Title 1">
+            <a:extLst>
+              <a:ext uri="{FF2B5EF4-FFF2-40B4-BE49-F238E27FC236}">
+                <a16:creationId xmlns:a16="http://schemas.microsoft.com/office/drawing/2014/main" id="{95198EA4-9897-CA4A-8B66-6E933FAAED88}"/>
+              </a:ext>
+            </a:extLst>
+          </p:cNvPr>
+          <p:cNvSpPr>
+            <a:spLocks noGrp="1"/>
+          </p:cNvSpPr>
+          <p:nvPr>
+            <p:ph type="title"/>
+          </p:nvPr>
+        </p:nvSpPr>
+        <p:spPr/>
+        <p:txBody>
+          <a:bodyPr/>
+          <a:lstStyle/>
+          <a:p>
+            <a:r>
+              <a:rPr lang="en-US" dirty="0"/>
+              <a:t>”Sprint 0” Tasks to Help Estimate Stories</a:t>
+            </a:r>
+          </a:p>
+        </p:txBody>
+      </p:sp>
+      <p:sp>
+        <p:nvSpPr>
+          <p:cNvPr id="3" name="Content Placeholder 2">
+            <a:extLst>
+              <a:ext uri="{FF2B5EF4-FFF2-40B4-BE49-F238E27FC236}">
+                <a16:creationId xmlns:a16="http://schemas.microsoft.com/office/drawing/2014/main" id="{0DD96934-8F3D-B749-9EF4-4C45C6A76519}"/>
+              </a:ext>
+            </a:extLst>
+          </p:cNvPr>
+          <p:cNvSpPr>
+            <a:spLocks noGrp="1"/>
+          </p:cNvSpPr>
+          <p:nvPr>
+            <p:ph idx="1"/>
+          </p:nvPr>
+        </p:nvSpPr>
+        <p:spPr>
+          <a:xfrm>
+            <a:off x="838199" y="1500160"/>
+            <a:ext cx="10515599" cy="4351338"/>
+          </a:xfrm>
+        </p:spPr>
+        <p:txBody>
+          <a:bodyPr/>
+          <a:lstStyle/>
+          <a:p>
+            <a:r>
+              <a:rPr lang="en-US" dirty="0"/>
+              <a:t>Find resources to gain more experience about a technology or about a problem domain</a:t>
+            </a:r>
+          </a:p>
+          <a:p>
+            <a:r>
+              <a:rPr lang="en-US" dirty="0"/>
+              <a:t>Create prototypes that you can throw away</a:t>
+            </a:r>
+          </a:p>
+          <a:p>
+            <a:r>
+              <a:rPr lang="en-US" dirty="0"/>
+              <a:t>Consider having multiple developers implement different approaches</a:t>
+            </a:r>
+          </a:p>
+          <a:p>
+            <a:r>
+              <a:rPr lang="en-US" dirty="0"/>
+              <a:t>Create load tests/simulations to identify the performance limits of technology or architecture</a:t>
+            </a:r>
+          </a:p>
+          <a:p>
+            <a:r>
+              <a:rPr lang="en-US" dirty="0"/>
+              <a:t>Learn just enough to make a </a:t>
+            </a:r>
+            <a:r>
+              <a:rPr lang="en-US" i="1" dirty="0"/>
+              <a:t>responsible</a:t>
+            </a:r>
+            <a:r>
+              <a:rPr lang="en-US" dirty="0"/>
+              <a:t> estimate</a:t>
+            </a:r>
+          </a:p>
+        </p:txBody>
+      </p:sp>
+      <p:sp>
+        <p:nvSpPr>
+          <p:cNvPr id="4" name="Slide Number Placeholder 3">
+            <a:extLst>
+              <a:ext uri="{FF2B5EF4-FFF2-40B4-BE49-F238E27FC236}">
+                <a16:creationId xmlns:a16="http://schemas.microsoft.com/office/drawing/2014/main" id="{C1CBD345-9840-7645-BF84-A4479465051B}"/>
+              </a:ext>
+            </a:extLst>
+          </p:cNvPr>
+          <p:cNvSpPr>
+            <a:spLocks noGrp="1"/>
+          </p:cNvSpPr>
+          <p:nvPr>
+            <p:ph type="sldNum" sz="quarter" idx="12"/>
+          </p:nvPr>
+        </p:nvSpPr>
+        <p:spPr/>
+        <p:txBody>
+          <a:bodyPr/>
+          <a:lstStyle/>
+          <a:p>
+            <a:fld id="{20F37917-FD3A-4669-9018-DA04BCDD3D75}" type="slidenum">
+              <a:rPr lang="en-US" smtClean="0"/>
+              <a:t>14</a:t>
+            </a:fld>
+            <a:endParaRPr lang="en-US"/>
+          </a:p>
+        </p:txBody>
+      </p:sp>
+    </p:spTree>
+    <p:extLst>
+      <p:ext uri="{BB962C8B-B14F-4D97-AF65-F5344CB8AC3E}">
+        <p14:creationId xmlns:p14="http://schemas.microsoft.com/office/powerpoint/2010/main" val="1851008461"/>
       </p:ext>
     </p:extLst>
   </p:cSld>
@@ -9266,7 +9506,7 @@
           <p:cNvPr id="2" name="Title 1">
             <a:extLst>
               <a:ext uri="{FF2B5EF4-FFF2-40B4-BE49-F238E27FC236}">
-                <a16:creationId xmlns:a16="http://schemas.microsoft.com/office/drawing/2014/main" id="{95198EA4-9897-CA4A-8B66-6E933FAAED88}"/>
+                <a16:creationId xmlns:a16="http://schemas.microsoft.com/office/drawing/2014/main" id="{B757D396-2940-8C43-BAB6-4A04F25BB409}"/>
               </a:ext>
             </a:extLst>
           </p:cNvPr>
@@ -9284,7 +9524,7 @@
           <a:p>
             <a:r>
               <a:rPr lang="en-US" dirty="0"/>
-              <a:t>”Sprint 0” Tasks to Help Estimate Stories</a:t>
+              <a:t>Daily Scrum Meeting</a:t>
             </a:r>
           </a:p>
         </p:txBody>
@@ -9294,7 +9534,7 @@
           <p:cNvPr id="3" name="Content Placeholder 2">
             <a:extLst>
               <a:ext uri="{FF2B5EF4-FFF2-40B4-BE49-F238E27FC236}">
-                <a16:creationId xmlns:a16="http://schemas.microsoft.com/office/drawing/2014/main" id="{0DD96934-8F3D-B749-9EF4-4C45C6A76519}"/>
+                <a16:creationId xmlns:a16="http://schemas.microsoft.com/office/drawing/2014/main" id="{BAE1362A-A8BE-1540-8966-5C4B1A393FBB}"/>
               </a:ext>
             </a:extLst>
           </p:cNvPr>
@@ -9305,51 +9545,55 @@
             <p:ph idx="1"/>
           </p:nvPr>
         </p:nvSpPr>
-        <p:spPr>
-          <a:xfrm>
-            <a:off x="838199" y="1500160"/>
-            <a:ext cx="10515599" cy="4351338"/>
-          </a:xfrm>
-        </p:spPr>
+        <p:spPr/>
         <p:txBody>
           <a:bodyPr/>
           <a:lstStyle/>
           <a:p>
             <a:r>
               <a:rPr lang="en-US" dirty="0"/>
-              <a:t>Find resources to gain more experience about a technology or about a problem domain</a:t>
-            </a:r>
-          </a:p>
-          <a:p>
-            <a:r>
-              <a:rPr lang="en-US" dirty="0"/>
-              <a:t>Create prototypes that you can throw away</a:t>
-            </a:r>
-          </a:p>
-          <a:p>
-            <a:r>
-              <a:rPr lang="en-US" dirty="0"/>
-              <a:t>Consider having multiple developers implement different approaches</a:t>
-            </a:r>
-          </a:p>
-          <a:p>
-            <a:r>
-              <a:rPr lang="en-US" dirty="0"/>
-              <a:t>Create load tests/simulations to identify the performance limits of technology or architecture</a:t>
-            </a:r>
-          </a:p>
-          <a:p>
-            <a:r>
-              <a:rPr lang="en-US" dirty="0"/>
-              <a:t>Learn just enough to make a </a:t>
-            </a:r>
-            <a:r>
-              <a:rPr lang="en-US" i="1" dirty="0"/>
-              <a:t>responsible</a:t>
-            </a:r>
-            <a:r>
-              <a:rPr lang="en-US" dirty="0"/>
-              <a:t> estimate</a:t>
+              <a:t>15 minutes maximum “stand up” meeting</a:t>
+            </a:r>
+          </a:p>
+          <a:p>
+            <a:pPr lvl="1"/>
+            <a:r>
+              <a:rPr lang="en-US" dirty="0"/>
+              <a:t>What have I done?</a:t>
+            </a:r>
+          </a:p>
+          <a:p>
+            <a:pPr lvl="1"/>
+            <a:r>
+              <a:rPr lang="en-US" dirty="0"/>
+              <a:t>What am I working on?</a:t>
+            </a:r>
+          </a:p>
+          <a:p>
+            <a:pPr lvl="1"/>
+            <a:r>
+              <a:rPr lang="en-US" dirty="0"/>
+              <a:t>What am I stuck on/need help on?</a:t>
+            </a:r>
+          </a:p>
+          <a:p>
+            <a:r>
+              <a:rPr lang="en-US" dirty="0"/>
+              <a:t>Conversation focuses on goals:</a:t>
+            </a:r>
+          </a:p>
+          <a:p>
+            <a:pPr lvl="1"/>
+            <a:r>
+              <a:rPr lang="en-US" dirty="0"/>
+              <a:t>Transparency between team members</a:t>
+            </a:r>
+          </a:p>
+          <a:p>
+            <a:pPr lvl="1"/>
+            <a:r>
+              <a:rPr lang="en-US" dirty="0"/>
+              <a:t>Encourage adaptation</a:t>
             </a:r>
           </a:p>
         </p:txBody>
@@ -9359,7 +9603,7 @@
           <p:cNvPr id="4" name="Slide Number Placeholder 3">
             <a:extLst>
               <a:ext uri="{FF2B5EF4-FFF2-40B4-BE49-F238E27FC236}">
-                <a16:creationId xmlns:a16="http://schemas.microsoft.com/office/drawing/2014/main" id="{C1CBD345-9840-7645-BF84-A4479465051B}"/>
+                <a16:creationId xmlns:a16="http://schemas.microsoft.com/office/drawing/2014/main" id="{69025D52-2F32-524E-8211-935F33A3621B}"/>
               </a:ext>
             </a:extLst>
           </p:cNvPr>
@@ -9386,7 +9630,7 @@
     </p:spTree>
     <p:extLst>
       <p:ext uri="{BB962C8B-B14F-4D97-AF65-F5344CB8AC3E}">
-        <p14:creationId xmlns:p14="http://schemas.microsoft.com/office/powerpoint/2010/main" val="1851008461"/>
+        <p14:creationId xmlns:p14="http://schemas.microsoft.com/office/powerpoint/2010/main" val="2042169481"/>
       </p:ext>
     </p:extLst>
   </p:cSld>
@@ -9418,7 +9662,7 @@
           <p:cNvPr id="2" name="Title 1">
             <a:extLst>
               <a:ext uri="{FF2B5EF4-FFF2-40B4-BE49-F238E27FC236}">
-                <a16:creationId xmlns:a16="http://schemas.microsoft.com/office/drawing/2014/main" id="{B757D396-2940-8C43-BAB6-4A04F25BB409}"/>
+                <a16:creationId xmlns:a16="http://schemas.microsoft.com/office/drawing/2014/main" id="{1C0D1339-A191-4B11-1C20-9CA819E46D88}"/>
               </a:ext>
             </a:extLst>
           </p:cNvPr>
@@ -9436,7 +9680,7 @@
           <a:p>
             <a:r>
               <a:rPr lang="en-US" dirty="0"/>
-              <a:t>Daily Scrum</a:t>
+              <a:t>But we are just students!  What do we do?</a:t>
             </a:r>
           </a:p>
         </p:txBody>
@@ -9446,7 +9690,7 @@
           <p:cNvPr id="3" name="Content Placeholder 2">
             <a:extLst>
               <a:ext uri="{FF2B5EF4-FFF2-40B4-BE49-F238E27FC236}">
-                <a16:creationId xmlns:a16="http://schemas.microsoft.com/office/drawing/2014/main" id="{BAE1362A-A8BE-1540-8966-5C4B1A393FBB}"/>
+                <a16:creationId xmlns:a16="http://schemas.microsoft.com/office/drawing/2014/main" id="{4BB8D8C3-BF80-531E-43C3-CD63CDB1D1C4}"/>
               </a:ext>
             </a:extLst>
           </p:cNvPr>
@@ -9459,53 +9703,50 @@
         </p:nvSpPr>
         <p:spPr/>
         <p:txBody>
-          <a:bodyPr/>
-          <a:lstStyle/>
-          <a:p>
-            <a:r>
-              <a:rPr lang="en-US" dirty="0"/>
-              <a:t>15 minutes maximum “stand up” meeting</a:t>
-            </a:r>
-          </a:p>
-          <a:p>
-            <a:pPr lvl="1"/>
-            <a:r>
-              <a:rPr lang="en-US" dirty="0"/>
-              <a:t>What have I done?</a:t>
-            </a:r>
-          </a:p>
-          <a:p>
-            <a:pPr lvl="1"/>
-            <a:r>
-              <a:rPr lang="en-US" dirty="0"/>
-              <a:t>What am I working on?</a:t>
-            </a:r>
-          </a:p>
-          <a:p>
-            <a:pPr lvl="1"/>
-            <a:r>
-              <a:rPr lang="en-US" dirty="0"/>
-              <a:t>What am I stuck on/need help on?</a:t>
-            </a:r>
-          </a:p>
-          <a:p>
-            <a:r>
-              <a:rPr lang="en-US" dirty="0"/>
-              <a:t>Conversation focuses on goals:</a:t>
-            </a:r>
-          </a:p>
-          <a:p>
-            <a:pPr lvl="1"/>
-            <a:r>
-              <a:rPr lang="en-US" dirty="0"/>
-              <a:t>Transparency between team members</a:t>
-            </a:r>
-          </a:p>
-          <a:p>
-            <a:pPr lvl="1"/>
-            <a:r>
-              <a:rPr lang="en-US" dirty="0"/>
-              <a:t>Encourage adaptation</a:t>
+          <a:bodyPr>
+            <a:normAutofit fontScale="92500" lnSpcReduction="10000"/>
+          </a:bodyPr>
+          <a:lstStyle/>
+          <a:p>
+            <a:r>
+              <a:rPr lang="en-US" dirty="0"/>
+              <a:t>You will meet weekly with your TA, but that’s not enough.</a:t>
+            </a:r>
+          </a:p>
+          <a:p>
+            <a:r>
+              <a:rPr lang="en-US" dirty="0"/>
+              <a:t>Have regular check-ins.   Maybe every other day (M-W-F?) at a </a:t>
+            </a:r>
+            <a:r>
+              <a:rPr lang="en-US" b="1" dirty="0"/>
+              <a:t>fixed time.</a:t>
+            </a:r>
+          </a:p>
+          <a:p>
+            <a:r>
+              <a:rPr lang="en-US" dirty="0"/>
+              <a:t>Have a dedicated channel for communication between meetings.</a:t>
+            </a:r>
+          </a:p>
+          <a:p>
+            <a:r>
+              <a:rPr lang="en-US" dirty="0"/>
+              <a:t>Insist on a “heartbeat”: each member must check in on the dedicated channel </a:t>
+            </a:r>
+            <a:r>
+              <a:rPr lang="en-US" b="1" dirty="0"/>
+              <a:t>every day</a:t>
+            </a:r>
+            <a:r>
+              <a:rPr lang="en-US" dirty="0"/>
+              <a:t>.</a:t>
+            </a:r>
+          </a:p>
+          <a:p>
+            <a:r>
+              <a:rPr lang="en-US" dirty="0"/>
+              <a:t>If a team member is silent for 48 hours, the other team members should take notice and help that person solve their problem.</a:t>
             </a:r>
           </a:p>
         </p:txBody>
@@ -9515,7 +9756,7 @@
           <p:cNvPr id="4" name="Slide Number Placeholder 3">
             <a:extLst>
               <a:ext uri="{FF2B5EF4-FFF2-40B4-BE49-F238E27FC236}">
-                <a16:creationId xmlns:a16="http://schemas.microsoft.com/office/drawing/2014/main" id="{69025D52-2F32-524E-8211-935F33A3621B}"/>
+                <a16:creationId xmlns:a16="http://schemas.microsoft.com/office/drawing/2014/main" id="{B7A752D0-D85E-A55A-CB06-BA4B897E36AD}"/>
               </a:ext>
             </a:extLst>
           </p:cNvPr>
@@ -9542,7 +9783,7 @@
     </p:spTree>
     <p:extLst>
       <p:ext uri="{BB962C8B-B14F-4D97-AF65-F5344CB8AC3E}">
-        <p14:creationId xmlns:p14="http://schemas.microsoft.com/office/powerpoint/2010/main" val="2042169481"/>
+        <p14:creationId xmlns:p14="http://schemas.microsoft.com/office/powerpoint/2010/main" val="3513066855"/>
       </p:ext>
     </p:extLst>
   </p:cSld>
@@ -9999,225 +10240,6 @@
 </file>
 
 <file path=ppt/slides/slide3.xml><?xml version="1.0" encoding="utf-8"?>
-<p:sld xmlns:a="http://schemas.openxmlformats.org/drawingml/2006/main" xmlns:r="http://schemas.openxmlformats.org/officeDocument/2006/relationships" xmlns:p="http://schemas.openxmlformats.org/presentationml/2006/main">
-  <p:cSld>
-    <p:spTree>
-      <p:nvGrpSpPr>
-        <p:cNvPr id="1" name=""/>
-        <p:cNvGrpSpPr/>
-        <p:nvPr/>
-      </p:nvGrpSpPr>
-      <p:grpSpPr>
-        <a:xfrm>
-          <a:off x="0" y="0"/>
-          <a:ext cx="0" cy="0"/>
-          <a:chOff x="0" y="0"/>
-          <a:chExt cx="0" cy="0"/>
-        </a:xfrm>
-      </p:grpSpPr>
-      <p:sp>
-        <p:nvSpPr>
-          <p:cNvPr id="2" name="Title 1">
-            <a:extLst>
-              <a:ext uri="{FF2B5EF4-FFF2-40B4-BE49-F238E27FC236}">
-                <a16:creationId xmlns:a16="http://schemas.microsoft.com/office/drawing/2014/main" id="{16F86D58-152F-496B-BA81-FDA5B100832A}"/>
-              </a:ext>
-            </a:extLst>
-          </p:cNvPr>
-          <p:cNvSpPr>
-            <a:spLocks noGrp="1"/>
-          </p:cNvSpPr>
-          <p:nvPr>
-            <p:ph type="title"/>
-          </p:nvPr>
-        </p:nvSpPr>
-        <p:spPr/>
-        <p:txBody>
-          <a:bodyPr/>
-          <a:lstStyle/>
-          <a:p>
-            <a:r>
-              <a:rPr lang="en-US" dirty="0"/>
-              <a:t>Requirements: Which to pick?</a:t>
-            </a:r>
-          </a:p>
-        </p:txBody>
-      </p:sp>
-      <p:sp>
-        <p:nvSpPr>
-          <p:cNvPr id="4" name="Slide Number Placeholder 3">
-            <a:extLst>
-              <a:ext uri="{FF2B5EF4-FFF2-40B4-BE49-F238E27FC236}">
-                <a16:creationId xmlns:a16="http://schemas.microsoft.com/office/drawing/2014/main" id="{C7C3DEB3-F948-4B7E-8BDA-FB7ABCF7A993}"/>
-              </a:ext>
-            </a:extLst>
-          </p:cNvPr>
-          <p:cNvSpPr>
-            <a:spLocks noGrp="1"/>
-          </p:cNvSpPr>
-          <p:nvPr>
-            <p:ph type="sldNum" sz="quarter" idx="12"/>
-          </p:nvPr>
-        </p:nvSpPr>
-        <p:spPr/>
-        <p:txBody>
-          <a:bodyPr/>
-          <a:lstStyle/>
-          <a:p>
-            <a:fld id="{20F37917-FD3A-4669-9018-DA04BCDD3D75}" type="slidenum">
-              <a:rPr lang="en-US" smtClean="0"/>
-              <a:t>3</a:t>
-            </a:fld>
-            <a:endParaRPr lang="en-US"/>
-          </a:p>
-        </p:txBody>
-      </p:sp>
-      <p:sp>
-        <p:nvSpPr>
-          <p:cNvPr id="7" name="Content Placeholder 6">
-            <a:extLst>
-              <a:ext uri="{FF2B5EF4-FFF2-40B4-BE49-F238E27FC236}">
-                <a16:creationId xmlns:a16="http://schemas.microsoft.com/office/drawing/2014/main" id="{695B468C-8A4C-334E-9ECE-6E4EE06EEA36}"/>
-              </a:ext>
-            </a:extLst>
-          </p:cNvPr>
-          <p:cNvSpPr>
-            <a:spLocks noGrp="1"/>
-          </p:cNvSpPr>
-          <p:nvPr>
-            <p:ph idx="1"/>
-          </p:nvPr>
-        </p:nvSpPr>
-        <p:spPr>
-          <a:xfrm>
-            <a:off x="838200" y="1500160"/>
-            <a:ext cx="10515600" cy="4351338"/>
-          </a:xfrm>
-        </p:spPr>
-        <p:txBody>
-          <a:bodyPr/>
-          <a:lstStyle/>
-          <a:p>
-            <a:r>
-              <a:rPr lang="en-US" dirty="0"/>
-              <a:t>There are four knobs you can adjust when negotiating requirements:</a:t>
-            </a:r>
-          </a:p>
-          <a:p>
-            <a:pPr lvl="1"/>
-            <a:r>
-              <a:rPr lang="en-US" dirty="0"/>
-              <a:t>Project scope</a:t>
-            </a:r>
-          </a:p>
-          <a:p>
-            <a:pPr lvl="1"/>
-            <a:r>
-              <a:rPr lang="en-US" dirty="0"/>
-              <a:t>Project duration</a:t>
-            </a:r>
-          </a:p>
-          <a:p>
-            <a:pPr lvl="1"/>
-            <a:r>
-              <a:rPr lang="en-US" dirty="0"/>
-              <a:t>Project quality</a:t>
-            </a:r>
-          </a:p>
-          <a:p>
-            <a:pPr lvl="1"/>
-            <a:r>
-              <a:rPr lang="en-US" dirty="0"/>
-              <a:t>Project cost</a:t>
-            </a:r>
-          </a:p>
-          <a:p>
-            <a:r>
-              <a:rPr lang="en-US" dirty="0"/>
-              <a:t>Usually cost is most constrained: you have a budget to spend, and you have a headcount of developers to pay</a:t>
-            </a:r>
-          </a:p>
-          <a:p>
-            <a:r>
-              <a:rPr lang="en-US" dirty="0"/>
-              <a:t>Determining feasible scope, timeline and maximizing quality is the subject of much software engineering research</a:t>
-            </a:r>
-          </a:p>
-        </p:txBody>
-      </p:sp>
-      <p:sp>
-        <p:nvSpPr>
-          <p:cNvPr id="8" name="TextBox 7">
-            <a:extLst>
-              <a:ext uri="{FF2B5EF4-FFF2-40B4-BE49-F238E27FC236}">
-                <a16:creationId xmlns:a16="http://schemas.microsoft.com/office/drawing/2014/main" id="{F62F96CF-020C-774F-947B-42E422E24849}"/>
-              </a:ext>
-            </a:extLst>
-          </p:cNvPr>
-          <p:cNvSpPr txBox="1"/>
-          <p:nvPr/>
-        </p:nvSpPr>
-        <p:spPr>
-          <a:xfrm>
-            <a:off x="3683000" y="2641600"/>
-            <a:ext cx="0" cy="0"/>
-          </a:xfrm>
-          <a:prstGeom prst="rect">
-            <a:avLst/>
-          </a:prstGeom>
-          <a:noFill/>
-          <a:ln>
-            <a:noFill/>
-          </a:ln>
-        </p:spPr>
-        <p:style>
-          <a:lnRef idx="2">
-            <a:schemeClr val="accent1">
-              <a:shade val="50000"/>
-            </a:schemeClr>
-          </a:lnRef>
-          <a:fillRef idx="1">
-            <a:schemeClr val="accent1"/>
-          </a:fillRef>
-          <a:effectRef idx="0">
-            <a:schemeClr val="accent1"/>
-          </a:effectRef>
-          <a:fontRef idx="minor">
-            <a:schemeClr val="lt1"/>
-          </a:fontRef>
-        </p:style>
-        <p:txBody>
-          <a:bodyPr rot="0" spcFirstLastPara="0" vertOverflow="overflow" horzOverflow="overflow" vert="horz" wrap="none" lIns="91440" tIns="45720" rIns="91440" bIns="45720" numCol="1" spcCol="0" rtlCol="0" fromWordArt="0" anchor="ctr" anchorCtr="0" forceAA="0" compatLnSpc="1">
-            <a:prstTxWarp prst="textNoShape">
-              <a:avLst/>
-            </a:prstTxWarp>
-            <a:noAutofit/>
-          </a:bodyPr>
-          <a:lstStyle/>
-          <a:p>
-            <a:pPr algn="l"/>
-            <a:endParaRPr lang="en-US" dirty="0">
-              <a:solidFill>
-                <a:schemeClr val="tx1"/>
-              </a:solidFill>
-            </a:endParaRPr>
-          </a:p>
-        </p:txBody>
-      </p:sp>
-    </p:spTree>
-    <p:extLst>
-      <p:ext uri="{BB962C8B-B14F-4D97-AF65-F5344CB8AC3E}">
-        <p14:creationId xmlns:p14="http://schemas.microsoft.com/office/powerpoint/2010/main" val="537342029"/>
-      </p:ext>
-    </p:extLst>
-  </p:cSld>
-  <p:clrMapOvr>
-    <a:masterClrMapping/>
-  </p:clrMapOvr>
-</p:sld>
-</file>
-
-<file path=ppt/slides/slide4.xml><?xml version="1.0" encoding="utf-8"?>
 <p:sld xmlns:a="http://schemas.openxmlformats.org/drawingml/2006/main" xmlns:r="http://schemas.openxmlformats.org/officeDocument/2006/relationships" xmlns:p="http://schemas.openxmlformats.org/presentationml/2006/main">
   <p:cSld>
     <p:bg>
@@ -10933,7 +10955,7 @@
                   <a:spcPts val="600"/>
                 </a:spcAft>
               </a:pPr>
-              <a:t>4</a:t>
+              <a:t>3</a:t>
             </a:fld>
             <a:endParaRPr lang="en-US">
               <a:solidFill>
@@ -10959,7 +10981,7 @@
 </p:sld>
 </file>
 
-<file path=ppt/slides/slide5.xml><?xml version="1.0" encoding="utf-8"?>
+<file path=ppt/slides/slide4.xml><?xml version="1.0" encoding="utf-8"?>
 <p:sld xmlns:a="http://schemas.openxmlformats.org/drawingml/2006/main" xmlns:r="http://schemas.openxmlformats.org/officeDocument/2006/relationships" xmlns:p="http://schemas.openxmlformats.org/presentationml/2006/main">
   <p:cSld>
     <p:spTree>
@@ -11095,7 +11117,7 @@
           <a:p>
             <a:fld id="{20F37917-FD3A-4669-9018-DA04BCDD3D75}" type="slidenum">
               <a:rPr lang="en-US" smtClean="0"/>
-              <a:t>5</a:t>
+              <a:t>4</a:t>
             </a:fld>
             <a:endParaRPr lang="en-US"/>
           </a:p>
@@ -11223,7 +11245,7 @@
 </p:sld>
 </file>
 
-<file path=ppt/slides/slide6.xml><?xml version="1.0" encoding="utf-8"?>
+<file path=ppt/slides/slide5.xml><?xml version="1.0" encoding="utf-8"?>
 <p:sld xmlns:a="http://schemas.openxmlformats.org/drawingml/2006/main" xmlns:r="http://schemas.openxmlformats.org/officeDocument/2006/relationships" xmlns:p="http://schemas.openxmlformats.org/presentationml/2006/main">
   <p:cSld>
     <p:spTree>
@@ -11291,7 +11313,7 @@
           <a:p>
             <a:fld id="{20F37917-FD3A-4669-9018-DA04BCDD3D75}" type="slidenum">
               <a:rPr lang="en-US" smtClean="0"/>
-              <a:t>6</a:t>
+              <a:t>5</a:t>
             </a:fld>
             <a:endParaRPr lang="en-US"/>
           </a:p>
@@ -11797,6 +11819,15 @@
               <a:t>No low level tasks</a:t>
             </a:r>
           </a:p>
+          <a:p>
+            <a:r>
+              <a:rPr lang="en-US" dirty="0"/>
+              <a:t>A living document</a:t>
+            </a:r>
+          </a:p>
+          <a:p>
+            <a:endParaRPr lang="en-US" dirty="0"/>
+          </a:p>
         </p:txBody>
       </p:sp>
     </p:spTree>
@@ -11812,7 +11843,7 @@
 </p:sld>
 </file>
 
-<file path=ppt/slides/slide7.xml><?xml version="1.0" encoding="utf-8"?>
+<file path=ppt/slides/slide6.xml><?xml version="1.0" encoding="utf-8"?>
 <p:sld xmlns:a="http://schemas.openxmlformats.org/drawingml/2006/main" xmlns:r="http://schemas.openxmlformats.org/officeDocument/2006/relationships" xmlns:p="http://schemas.openxmlformats.org/presentationml/2006/main">
   <p:cSld>
     <p:spTree>
@@ -11852,7 +11883,7 @@
           <a:p>
             <a:r>
               <a:rPr lang="en-US" dirty="0"/>
-              <a:t>Tracking and Prioritizing Tasks: Product Backlog</a:t>
+              <a:t>Tracking and Prioritizing Tasks: Product Backlog (revised)</a:t>
             </a:r>
           </a:p>
         </p:txBody>
@@ -11880,7 +11911,7 @@
           <a:p>
             <a:fld id="{20F37917-FD3A-4669-9018-DA04BCDD3D75}" type="slidenum">
               <a:rPr lang="en-US" smtClean="0"/>
-              <a:t>7</a:t>
+              <a:t>6</a:t>
             </a:fld>
             <a:endParaRPr lang="en-US"/>
           </a:p>
@@ -11901,7 +11932,7 @@
           <p:nvPr>
             <p:extLst>
               <p:ext uri="{D42A27DB-BD31-4B8C-83A1-F6EECF244321}">
-                <p14:modId xmlns:p14="http://schemas.microsoft.com/office/powerpoint/2010/main" val="2046472448"/>
+                <p14:modId xmlns:p14="http://schemas.microsoft.com/office/powerpoint/2010/main" val="3714748958"/>
               </p:ext>
             </p:extLst>
           </p:nvPr>
@@ -12097,7 +12128,11 @@
                     <a:lstStyle/>
                     <a:p>
                       <a:r>
-                        <a:rPr lang="en-US" dirty="0"/>
+                        <a:rPr lang="en-US" dirty="0">
+                          <a:solidFill>
+                            <a:srgbClr val="FF0000"/>
+                          </a:solidFill>
+                        </a:rPr>
                         <a:t>Low</a:t>
                       </a:r>
                     </a:p>
@@ -12243,7 +12278,11 @@
                     <a:lstStyle/>
                     <a:p>
                       <a:r>
-                        <a:rPr lang="en-US" dirty="0"/>
+                        <a:rPr lang="en-US" dirty="0">
+                          <a:solidFill>
+                            <a:srgbClr val="FF0000"/>
+                          </a:solidFill>
+                        </a:rPr>
                         <a:t>High</a:t>
                       </a:r>
                     </a:p>
@@ -12416,7 +12455,7 @@
 </p:sld>
 </file>
 
-<file path=ppt/slides/slide8.xml><?xml version="1.0" encoding="utf-8"?>
+<file path=ppt/slides/slide7.xml><?xml version="1.0" encoding="utf-8"?>
 <p:sld xmlns:a="http://schemas.openxmlformats.org/drawingml/2006/main" xmlns:r="http://schemas.openxmlformats.org/officeDocument/2006/relationships" xmlns:p="http://schemas.openxmlformats.org/presentationml/2006/main">
   <p:cSld>
     <p:spTree>
@@ -12484,7 +12523,7 @@
           <a:p>
             <a:fld id="{20F37917-FD3A-4669-9018-DA04BCDD3D75}" type="slidenum">
               <a:rPr lang="en-US" smtClean="0"/>
-              <a:t>8</a:t>
+              <a:t>7</a:t>
             </a:fld>
             <a:endParaRPr lang="en-US"/>
           </a:p>
@@ -12533,7 +12572,7 @@
 </p:sld>
 </file>
 
-<file path=ppt/slides/slide9.xml><?xml version="1.0" encoding="utf-8"?>
+<file path=ppt/slides/slide8.xml><?xml version="1.0" encoding="utf-8"?>
 <p:sld xmlns:a="http://schemas.openxmlformats.org/drawingml/2006/main" xmlns:r="http://schemas.openxmlformats.org/officeDocument/2006/relationships" xmlns:p="http://schemas.openxmlformats.org/presentationml/2006/main">
   <p:cSld>
     <p:spTree>
@@ -12666,7 +12705,7 @@
           <a:p>
             <a:fld id="{20F37917-FD3A-4669-9018-DA04BCDD3D75}" type="slidenum">
               <a:rPr lang="en-US" smtClean="0"/>
-              <a:t>9</a:t>
+              <a:t>8</a:t>
             </a:fld>
             <a:endParaRPr lang="en-US"/>
           </a:p>
@@ -12735,6 +12774,232 @@
     <p:extLst>
       <p:ext uri="{BB962C8B-B14F-4D97-AF65-F5344CB8AC3E}">
         <p14:creationId xmlns:p14="http://schemas.microsoft.com/office/powerpoint/2010/main" val="2581241508"/>
+      </p:ext>
+    </p:extLst>
+  </p:cSld>
+  <p:clrMapOvr>
+    <a:masterClrMapping/>
+  </p:clrMapOvr>
+</p:sld>
+</file>
+
+<file path=ppt/slides/slide9.xml><?xml version="1.0" encoding="utf-8"?>
+<p:sld xmlns:a="http://schemas.openxmlformats.org/drawingml/2006/main" xmlns:r="http://schemas.openxmlformats.org/officeDocument/2006/relationships" xmlns:p="http://schemas.openxmlformats.org/presentationml/2006/main">
+  <p:cSld>
+    <p:spTree>
+      <p:nvGrpSpPr>
+        <p:cNvPr id="1" name=""/>
+        <p:cNvGrpSpPr/>
+        <p:nvPr/>
+      </p:nvGrpSpPr>
+      <p:grpSpPr>
+        <a:xfrm>
+          <a:off x="0" y="0"/>
+          <a:ext cx="0" cy="0"/>
+          <a:chOff x="0" y="0"/>
+          <a:chExt cx="0" cy="0"/>
+        </a:xfrm>
+      </p:grpSpPr>
+      <p:sp>
+        <p:nvSpPr>
+          <p:cNvPr id="2" name="Title 1">
+            <a:extLst>
+              <a:ext uri="{FF2B5EF4-FFF2-40B4-BE49-F238E27FC236}">
+                <a16:creationId xmlns:a16="http://schemas.microsoft.com/office/drawing/2014/main" id="{BF181906-AFAD-2443-AA7E-27F23CC0B974}"/>
+              </a:ext>
+            </a:extLst>
+          </p:cNvPr>
+          <p:cNvSpPr>
+            <a:spLocks noGrp="1"/>
+          </p:cNvSpPr>
+          <p:nvPr>
+            <p:ph type="title"/>
+          </p:nvPr>
+        </p:nvSpPr>
+        <p:spPr/>
+        <p:txBody>
+          <a:bodyPr/>
+          <a:lstStyle/>
+          <a:p>
+            <a:r>
+              <a:rPr lang="en-US" dirty="0"/>
+              <a:t>Decomposing stories into tasks.</a:t>
+            </a:r>
+          </a:p>
+        </p:txBody>
+      </p:sp>
+      <p:sp>
+        <p:nvSpPr>
+          <p:cNvPr id="3" name="Content Placeholder 2">
+            <a:extLst>
+              <a:ext uri="{FF2B5EF4-FFF2-40B4-BE49-F238E27FC236}">
+                <a16:creationId xmlns:a16="http://schemas.microsoft.com/office/drawing/2014/main" id="{9678B439-61A3-F547-A942-3898EA583C22}"/>
+              </a:ext>
+            </a:extLst>
+          </p:cNvPr>
+          <p:cNvSpPr>
+            <a:spLocks noGrp="1"/>
+          </p:cNvSpPr>
+          <p:nvPr>
+            <p:ph idx="1"/>
+          </p:nvPr>
+        </p:nvSpPr>
+        <p:spPr>
+          <a:xfrm>
+            <a:off x="838200" y="1500159"/>
+            <a:ext cx="7887346" cy="4998611"/>
+          </a:xfrm>
+        </p:spPr>
+        <p:txBody>
+          <a:bodyPr>
+            <a:normAutofit fontScale="92500" lnSpcReduction="20000"/>
+          </a:bodyPr>
+          <a:lstStyle/>
+          <a:p>
+            <a:r>
+              <a:rPr lang="en-US" dirty="0"/>
+              <a:t>Sprint Focus (user stories from the project backlog):</a:t>
+            </a:r>
+          </a:p>
+          <a:p>
+            <a:pPr lvl="1"/>
+            <a:r>
+              <a:rPr lang="en-US" dirty="0"/>
+              <a:t>“The driver’s interface should display unplowed streets”</a:t>
+            </a:r>
+          </a:p>
+          <a:p>
+            <a:pPr lvl="1"/>
+            <a:r>
+              <a:rPr lang="en-US" dirty="0"/>
+              <a:t>“The driver’s interface should track which streets have been plowed”</a:t>
+            </a:r>
+          </a:p>
+          <a:p>
+            <a:r>
+              <a:rPr lang="en-US" dirty="0"/>
+              <a:t>Sprint tasks:</a:t>
+            </a:r>
+          </a:p>
+          <a:p>
+            <a:pPr lvl="1"/>
+            <a:r>
+              <a:rPr lang="en-US" dirty="0"/>
+              <a:t>Tasks for API design</a:t>
+            </a:r>
+          </a:p>
+          <a:p>
+            <a:pPr lvl="2"/>
+            <a:r>
+              <a:rPr lang="en-US" dirty="0"/>
+              <a:t>Work out the interface for CRUD on plowed streets</a:t>
+            </a:r>
+          </a:p>
+          <a:p>
+            <a:pPr lvl="1"/>
+            <a:r>
+              <a:rPr lang="en-US" dirty="0"/>
+              <a:t>Tasks for app development</a:t>
+            </a:r>
+          </a:p>
+          <a:p>
+            <a:pPr lvl="2"/>
+            <a:r>
+              <a:rPr lang="en-US" dirty="0"/>
+              <a:t>Design the interface for viewing unplowed streets</a:t>
+            </a:r>
+          </a:p>
+          <a:p>
+            <a:pPr lvl="2"/>
+            <a:r>
+              <a:rPr lang="en-US" dirty="0"/>
+              <a:t>Create the map interface that shows streets in the city</a:t>
+            </a:r>
+          </a:p>
+          <a:p>
+            <a:pPr lvl="2"/>
+            <a:r>
+              <a:rPr lang="en-US" dirty="0"/>
+              <a:t>Fetch unplowed streets from API and update the map</a:t>
+            </a:r>
+          </a:p>
+          <a:p>
+            <a:pPr lvl="2"/>
+            <a:r>
+              <a:rPr lang="en-US" dirty="0"/>
+              <a:t>Update the API with current location while plowing in progress</a:t>
+            </a:r>
+          </a:p>
+          <a:p>
+            <a:pPr lvl="1"/>
+            <a:r>
+              <a:rPr lang="en-US" dirty="0"/>
+              <a:t>Tasks for backend development</a:t>
+            </a:r>
+          </a:p>
+          <a:p>
+            <a:pPr lvl="2"/>
+            <a:r>
+              <a:rPr lang="en-US" dirty="0"/>
+              <a:t>Determine how to model and store plowed street data</a:t>
+            </a:r>
+          </a:p>
+          <a:p>
+            <a:pPr lvl="2"/>
+            <a:r>
+              <a:rPr lang="en-US" dirty="0"/>
+              <a:t>Implement tests for expected API behavior</a:t>
+            </a:r>
+          </a:p>
+          <a:p>
+            <a:pPr lvl="2"/>
+            <a:r>
+              <a:rPr lang="en-US" dirty="0"/>
+              <a:t>Implement API to mark street as plowed</a:t>
+            </a:r>
+          </a:p>
+          <a:p>
+            <a:pPr lvl="2"/>
+            <a:r>
+              <a:rPr lang="en-US" dirty="0"/>
+              <a:t>Implement API to fetch unplowed streets</a:t>
+            </a:r>
+          </a:p>
+        </p:txBody>
+      </p:sp>
+      <p:sp>
+        <p:nvSpPr>
+          <p:cNvPr id="4" name="Slide Number Placeholder 3">
+            <a:extLst>
+              <a:ext uri="{FF2B5EF4-FFF2-40B4-BE49-F238E27FC236}">
+                <a16:creationId xmlns:a16="http://schemas.microsoft.com/office/drawing/2014/main" id="{E9E06C14-8AD7-E641-9D08-C4FCED22BDA2}"/>
+              </a:ext>
+            </a:extLst>
+          </p:cNvPr>
+          <p:cNvSpPr>
+            <a:spLocks noGrp="1"/>
+          </p:cNvSpPr>
+          <p:nvPr>
+            <p:ph type="sldNum" sz="quarter" idx="12"/>
+          </p:nvPr>
+        </p:nvSpPr>
+        <p:spPr/>
+        <p:txBody>
+          <a:bodyPr/>
+          <a:lstStyle/>
+          <a:p>
+            <a:fld id="{20F37917-FD3A-4669-9018-DA04BCDD3D75}" type="slidenum">
+              <a:rPr lang="en-US" smtClean="0"/>
+              <a:t>9</a:t>
+            </a:fld>
+            <a:endParaRPr lang="en-US"/>
+          </a:p>
+        </p:txBody>
+      </p:sp>
+    </p:spTree>
+    <p:extLst>
+      <p:ext uri="{BB962C8B-B14F-4D97-AF65-F5344CB8AC3E}">
+        <p14:creationId xmlns:p14="http://schemas.microsoft.com/office/powerpoint/2010/main" val="2524749999"/>
       </p:ext>
     </p:extLst>
   </p:cSld>

</xml_diff>